<commit_message>
Dump of mysql DB. Includes the data.
</commit_message>
<xml_diff>
--- a/Presentation_Projet_6.pptx
+++ b/Presentation_Projet_6.pptx
@@ -5,15 +5,16 @@
     <p:sldMasterId id="2147483660" r:id="rId1"/>
   </p:sldMasterIdLst>
   <p:notesMasterIdLst>
-    <p:notesMasterId r:id="rId8"/>
+    <p:notesMasterId r:id="rId9"/>
   </p:notesMasterIdLst>
   <p:sldIdLst>
     <p:sldId id="257" r:id="rId2"/>
     <p:sldId id="258" r:id="rId3"/>
-    <p:sldId id="271" r:id="rId4"/>
-    <p:sldId id="266" r:id="rId5"/>
-    <p:sldId id="269" r:id="rId6"/>
-    <p:sldId id="270" r:id="rId7"/>
+    <p:sldId id="272" r:id="rId4"/>
+    <p:sldId id="274" r:id="rId5"/>
+    <p:sldId id="273" r:id="rId6"/>
+    <p:sldId id="271" r:id="rId7"/>
+    <p:sldId id="266" r:id="rId8"/>
   </p:sldIdLst>
   <p:sldSz cx="9906000" cy="6858000" type="A4"/>
   <p:notesSz cx="6858000" cy="9144000"/>
@@ -3611,18 +3612,19 @@
               <a:rPr lang="fr-FR" sz="2800" b="1" dirty="0"/>
             </a:br>
             <a:r>
+              <a:rPr lang="fr-FR" sz="3200" b="1" dirty="0" err="1"/>
+              <a:t>Technical</a:t>
+            </a:r>
+            <a:r>
               <a:rPr lang="fr-FR" sz="3200" b="1" dirty="0"/>
-              <a:t>Projet d’un système de Gestion </a:t>
+              <a:t> </a:t>
+            </a:r>
+            <a:r>
+              <a:rPr lang="fr-FR" sz="3200" b="1" dirty="0" err="1"/>
+              <a:t>Specifications</a:t>
             </a:r>
             <a:br>
               <a:rPr lang="fr-FR" sz="3200" b="1" dirty="0"/>
-            </a:br>
-            <a:r>
-              <a:rPr lang="fr-FR" sz="3200" b="1" dirty="0"/>
-              <a:t>pour OC Pizza</a:t>
-            </a:r>
-            <a:br>
-              <a:rPr lang="fr-FR" sz="2800" b="1" dirty="0"/>
             </a:br>
             <a:br>
               <a:rPr lang="fr-FR" sz="2400" dirty="0"/>
@@ -3631,7 +3633,7 @@
               <a:rPr lang="fr-FR" sz="2400" dirty="0">
                 <a:hlinkClick r:id="rId2"/>
               </a:rPr>
-              <a:t>https://github.com/Fabrice-64/OC_Projet_4</a:t>
+              <a:t>https://github.com/Fabrice-64/OC_Project_6</a:t>
             </a:r>
             <a:endParaRPr lang="fr-FR" sz="2400" dirty="0"/>
           </a:p>
@@ -3796,7 +3798,7 @@
                 </a:solidFill>
                 <a:latin typeface="Apple Braille" pitchFamily="2" charset="0"/>
               </a:rPr>
-              <a:t>Plan</a:t>
+              <a:t>Slides</a:t>
             </a:r>
             <a:endParaRPr lang="fr-FR" sz="2400" dirty="0"/>
           </a:p>
@@ -3844,8 +3846,8 @@
         </p:nvSpPr>
         <p:spPr>
           <a:xfrm>
-            <a:off x="787077" y="1342663"/>
-            <a:ext cx="6412375" cy="1815882"/>
+            <a:off x="1642100" y="1613118"/>
+            <a:ext cx="6412375" cy="2677656"/>
           </a:xfrm>
           <a:prstGeom prst="rect">
             <a:avLst/>
@@ -3862,13 +3864,34 @@
               <a:buAutoNum type="arabicPeriod"/>
             </a:pPr>
             <a:r>
+              <a:rPr lang="fr-FR" sz="2800" dirty="0" err="1">
+                <a:solidFill>
+                  <a:schemeClr val="accent1"/>
+                </a:solidFill>
+              </a:rPr>
+              <a:t>Context</a:t>
+            </a:r>
+            <a:r>
               <a:rPr lang="fr-FR" sz="2800" dirty="0">
                 <a:solidFill>
                   <a:schemeClr val="accent1"/>
                 </a:solidFill>
               </a:rPr>
-              <a:t>Contexte</a:t>
-            </a:r>
+              <a:t> </a:t>
+            </a:r>
+            <a:r>
+              <a:rPr lang="fr-FR" sz="2800" dirty="0" err="1">
+                <a:solidFill>
+                  <a:schemeClr val="accent1"/>
+                </a:solidFill>
+              </a:rPr>
+              <a:t>Diagram</a:t>
+            </a:r>
+            <a:endParaRPr lang="fr-FR" sz="2800" dirty="0">
+              <a:solidFill>
+                <a:schemeClr val="accent1"/>
+              </a:solidFill>
+            </a:endParaRPr>
           </a:p>
           <a:p>
             <a:pPr marL="342900" indent="-342900">
@@ -3880,20 +3903,101 @@
                   <a:schemeClr val="accent1"/>
                 </a:solidFill>
               </a:rPr>
-              <a:t>Ce qu’apporte notre solution</a:t>
-            </a:r>
+              <a:t>Package </a:t>
+            </a:r>
+            <a:r>
+              <a:rPr lang="fr-FR" sz="2800" dirty="0" err="1">
+                <a:solidFill>
+                  <a:schemeClr val="accent1"/>
+                </a:solidFill>
+              </a:rPr>
+              <a:t>Diagram</a:t>
+            </a:r>
+            <a:endParaRPr lang="fr-FR" sz="2800" dirty="0">
+              <a:solidFill>
+                <a:schemeClr val="accent1"/>
+              </a:solidFill>
+            </a:endParaRPr>
           </a:p>
           <a:p>
             <a:pPr marL="342900" indent="-342900">
               <a:buAutoNum type="arabicPeriod"/>
             </a:pPr>
             <a:r>
+              <a:rPr lang="fr-FR" sz="2800" dirty="0" err="1">
+                <a:solidFill>
+                  <a:schemeClr val="accent1"/>
+                </a:solidFill>
+              </a:rPr>
+              <a:t>Order</a:t>
+            </a:r>
+            <a:r>
               <a:rPr lang="fr-FR" sz="2800" dirty="0">
                 <a:solidFill>
                   <a:schemeClr val="accent1"/>
                 </a:solidFill>
               </a:rPr>
-              <a:t>Choix technique</a:t>
+              <a:t> </a:t>
+            </a:r>
+            <a:r>
+              <a:rPr lang="fr-FR" sz="2800" dirty="0" err="1">
+                <a:solidFill>
+                  <a:schemeClr val="accent1"/>
+                </a:solidFill>
+              </a:rPr>
+              <a:t>Process</a:t>
+            </a:r>
+            <a:endParaRPr lang="fr-FR" sz="2800" dirty="0">
+              <a:solidFill>
+                <a:schemeClr val="accent1"/>
+              </a:solidFill>
+            </a:endParaRPr>
+          </a:p>
+          <a:p>
+            <a:pPr marL="342900" indent="-342900">
+              <a:buAutoNum type="arabicPeriod"/>
+            </a:pPr>
+            <a:r>
+              <a:rPr lang="fr-FR" sz="2800" dirty="0">
+                <a:solidFill>
+                  <a:schemeClr val="accent1"/>
+                </a:solidFill>
+              </a:rPr>
+              <a:t>System </a:t>
+            </a:r>
+            <a:r>
+              <a:rPr lang="fr-FR" sz="2800" dirty="0" err="1">
+                <a:solidFill>
+                  <a:schemeClr val="accent1"/>
+                </a:solidFill>
+              </a:rPr>
+              <a:t>Deployment</a:t>
+            </a:r>
+            <a:endParaRPr lang="fr-FR" sz="2800" dirty="0">
+              <a:solidFill>
+                <a:schemeClr val="accent1"/>
+              </a:solidFill>
+            </a:endParaRPr>
+          </a:p>
+          <a:p>
+            <a:pPr marL="342900" indent="-342900">
+              <a:buAutoNum type="arabicPeriod"/>
+            </a:pPr>
+            <a:r>
+              <a:rPr lang="fr-FR" sz="2800" dirty="0" err="1">
+                <a:solidFill>
+                  <a:schemeClr val="accent1"/>
+                </a:solidFill>
+              </a:rPr>
+              <a:t>Technical</a:t>
+            </a:r>
+            <a:r>
+              <a:rPr lang="fr-FR" sz="2800" dirty="0">
+                <a:solidFill>
+                  <a:schemeClr val="accent1"/>
+                </a:solidFill>
+              </a:rPr>
+              <a:t> solution</a:t>
             </a:r>
           </a:p>
           <a:p>
@@ -3968,22 +4072,13 @@
           <a:p>
             <a:pPr algn="l"/>
             <a:r>
-              <a:rPr lang="fr-FR" sz="2800" b="1" dirty="0">
+              <a:rPr lang="fr-FR" sz="2800" b="1">
                 <a:solidFill>
                   <a:schemeClr val="accent1"/>
                 </a:solidFill>
                 <a:latin typeface="Apple Braille" pitchFamily="2" charset="0"/>
               </a:rPr>
-              <a:t>3. Choix technique: Simplicité du mode </a:t>
-            </a:r>
-            <a:r>
-              <a:rPr lang="fr-FR" sz="2800" b="1" dirty="0" err="1">
-                <a:solidFill>
-                  <a:schemeClr val="accent1"/>
-                </a:solidFill>
-                <a:latin typeface="Apple Braille" pitchFamily="2" charset="0"/>
-              </a:rPr>
-              <a:t>SaaS</a:t>
+              <a:t>Context Diagram</a:t>
             </a:r>
             <a:endParaRPr lang="fr-FR" sz="2400" dirty="0"/>
           </a:p>
@@ -4011,285 +4106,47 @@
           <a:lstStyle/>
           <a:p>
             <a:r>
-              <a:rPr lang="fr-FR" dirty="0"/>
+              <a:rPr lang="fr-FR"/>
               <a:t>IT C&amp;D</a:t>
             </a:r>
+            <a:endParaRPr lang="fr-FR" dirty="0"/>
           </a:p>
         </p:txBody>
       </p:sp>
       <p:pic>
         <p:nvPicPr>
-          <p:cNvPr id="5" name="Image 4">
+          <p:cNvPr id="6" name="Image 5">
             <a:extLst>
               <a:ext uri="{FF2B5EF4-FFF2-40B4-BE49-F238E27FC236}">
-                <a16:creationId xmlns:a16="http://schemas.microsoft.com/office/drawing/2014/main" id="{A9B10095-B87C-AE4E-8CA1-E288C8843876}"/>
+                <a16:creationId xmlns:a16="http://schemas.microsoft.com/office/drawing/2014/main" id="{0C0FEB95-BE40-0F48-A25A-07AF08F73B29}"/>
               </a:ext>
             </a:extLst>
           </p:cNvPr>
-          <p:cNvPicPr/>
+          <p:cNvPicPr>
+            <a:picLocks noChangeAspect="1"/>
+          </p:cNvPicPr>
           <p:nvPr/>
         </p:nvPicPr>
         <p:blipFill>
-          <a:blip r:embed="rId2">
-            <a:extLst>
-              <a:ext uri="{28A0092B-C50C-407E-A947-70E740481C1C}">
-                <a14:useLocalDpi xmlns:a14="http://schemas.microsoft.com/office/drawing/2010/main" val="0"/>
-              </a:ext>
-            </a:extLst>
-          </a:blip>
+          <a:blip r:embed="rId2"/>
           <a:stretch>
             <a:fillRect/>
           </a:stretch>
         </p:blipFill>
         <p:spPr>
           <a:xfrm>
-            <a:off x="4278489" y="1226917"/>
-            <a:ext cx="5345672" cy="4440106"/>
+            <a:off x="1346200" y="1226916"/>
+            <a:ext cx="7213600" cy="4775200"/>
           </a:xfrm>
           <a:prstGeom prst="rect">
             <a:avLst/>
           </a:prstGeom>
         </p:spPr>
       </p:pic>
-      <p:sp>
-        <p:nvSpPr>
-          <p:cNvPr id="4" name="ZoneTexte 3">
-            <a:extLst>
-              <a:ext uri="{FF2B5EF4-FFF2-40B4-BE49-F238E27FC236}">
-                <a16:creationId xmlns:a16="http://schemas.microsoft.com/office/drawing/2014/main" id="{95699583-B45A-254D-AF9B-41F7FCFAACB4}"/>
-              </a:ext>
-            </a:extLst>
-          </p:cNvPr>
-          <p:cNvSpPr txBox="1"/>
-          <p:nvPr/>
-        </p:nvSpPr>
-        <p:spPr>
-          <a:xfrm>
-            <a:off x="445168" y="1323474"/>
-            <a:ext cx="3754299" cy="3693319"/>
-          </a:xfrm>
-          <a:prstGeom prst="rect">
-            <a:avLst/>
-          </a:prstGeom>
-          <a:noFill/>
-        </p:spPr>
-        <p:txBody>
-          <a:bodyPr wrap="square" rtlCol="0">
-            <a:spAutoFit/>
-          </a:bodyPr>
-          <a:lstStyle/>
-          <a:p>
-            <a:r>
-              <a:rPr lang="fr-FR" b="1" dirty="0">
-                <a:solidFill>
-                  <a:schemeClr val="accent1"/>
-                </a:solidFill>
-              </a:rPr>
-              <a:t>Hébergement type Cloud :</a:t>
-            </a:r>
-          </a:p>
-          <a:p>
-            <a:r>
-              <a:rPr lang="fr-FR" dirty="0">
-                <a:solidFill>
-                  <a:schemeClr val="accent1"/>
-                </a:solidFill>
-              </a:rPr>
-              <a:t> + économique que le VPS ou serveur privé</a:t>
-            </a:r>
-          </a:p>
-          <a:p>
-            <a:r>
-              <a:rPr lang="fr-FR" dirty="0">
-                <a:solidFill>
-                  <a:schemeClr val="accent1"/>
-                </a:solidFill>
-              </a:rPr>
-              <a:t>+ efficace que le serveur mutualisé</a:t>
-            </a:r>
-          </a:p>
-          <a:p>
-            <a:r>
-              <a:rPr lang="fr-FR" dirty="0">
-                <a:solidFill>
-                  <a:schemeClr val="accent1"/>
-                </a:solidFill>
-              </a:rPr>
-              <a:t>- coûteux que le serveur dédié</a:t>
-            </a:r>
-          </a:p>
-          <a:p>
-            <a:endParaRPr lang="fr-FR" dirty="0">
-              <a:solidFill>
-                <a:schemeClr val="accent1"/>
-              </a:solidFill>
-            </a:endParaRPr>
-          </a:p>
-          <a:p>
-            <a:r>
-              <a:rPr lang="fr-FR" b="1" dirty="0">
-                <a:solidFill>
-                  <a:schemeClr val="accent1"/>
-                </a:solidFill>
-              </a:rPr>
-              <a:t>Pourquoi le mode Saas ?</a:t>
-            </a:r>
-          </a:p>
-          <a:p>
-            <a:r>
-              <a:rPr lang="fr-FR" dirty="0">
-                <a:solidFill>
-                  <a:schemeClr val="accent1"/>
-                </a:solidFill>
-              </a:rPr>
-              <a:t>Maintenance opérée par IT C&amp;D</a:t>
-            </a:r>
-          </a:p>
-          <a:p>
-            <a:r>
-              <a:rPr lang="fr-FR" dirty="0">
-                <a:solidFill>
-                  <a:schemeClr val="accent1"/>
-                </a:solidFill>
-              </a:rPr>
-              <a:t>Forte résilience et disponibilité</a:t>
-            </a:r>
-          </a:p>
-          <a:p>
-            <a:r>
-              <a:rPr lang="fr-FR" dirty="0">
-                <a:solidFill>
-                  <a:schemeClr val="accent1"/>
-                </a:solidFill>
-              </a:rPr>
-              <a:t>Forte sécurité des données</a:t>
-            </a:r>
-          </a:p>
-          <a:p>
-            <a:r>
-              <a:rPr lang="fr-FR" dirty="0">
-                <a:solidFill>
-                  <a:schemeClr val="accent1"/>
-                </a:solidFill>
-              </a:rPr>
-              <a:t>Accompagne croissance OC Pizza</a:t>
-            </a:r>
-          </a:p>
-          <a:p>
-            <a:r>
-              <a:rPr lang="fr-FR" dirty="0">
-                <a:solidFill>
-                  <a:schemeClr val="accent1"/>
-                </a:solidFill>
-              </a:rPr>
-              <a:t>Pas d’investissement en matériel</a:t>
-            </a:r>
-          </a:p>
-          <a:p>
-            <a:endParaRPr lang="fr-FR" dirty="0">
-              <a:solidFill>
-                <a:schemeClr val="accent1"/>
-              </a:solidFill>
-            </a:endParaRPr>
-          </a:p>
-        </p:txBody>
-      </p:sp>
-      <p:sp>
-        <p:nvSpPr>
-          <p:cNvPr id="6" name="ZoneTexte 5">
-            <a:extLst>
-              <a:ext uri="{FF2B5EF4-FFF2-40B4-BE49-F238E27FC236}">
-                <a16:creationId xmlns:a16="http://schemas.microsoft.com/office/drawing/2014/main" id="{C67DE86E-F30E-A44C-B671-E81BABEFB561}"/>
-              </a:ext>
-            </a:extLst>
-          </p:cNvPr>
-          <p:cNvSpPr txBox="1"/>
-          <p:nvPr/>
-        </p:nvSpPr>
-        <p:spPr>
-          <a:xfrm>
-            <a:off x="548839" y="5169796"/>
-            <a:ext cx="8912503" cy="1200329"/>
-          </a:xfrm>
-          <a:prstGeom prst="rect">
-            <a:avLst/>
-          </a:prstGeom>
-          <a:noFill/>
-        </p:spPr>
-        <p:txBody>
-          <a:bodyPr wrap="square" rtlCol="0">
-            <a:spAutoFit/>
-          </a:bodyPr>
-          <a:lstStyle/>
-          <a:p>
-            <a:r>
-              <a:rPr lang="fr-FR" b="1" dirty="0"/>
-              <a:t>Sources : </a:t>
-            </a:r>
-          </a:p>
-          <a:p>
-            <a:r>
-              <a:rPr lang="fr-FR" dirty="0"/>
-              <a:t>Comparatif des hébergements: </a:t>
-            </a:r>
-            <a:r>
-              <a:rPr lang="fr-FR" dirty="0">
-                <a:hlinkClick r:id="rId3"/>
-              </a:rPr>
-              <a:t>Web and Co</a:t>
-            </a:r>
-            <a:r>
-              <a:rPr lang="fr-FR" dirty="0"/>
-              <a:t> ; </a:t>
-            </a:r>
-            <a:r>
-              <a:rPr lang="fr-FR" dirty="0">
-                <a:hlinkClick r:id="rId4"/>
-              </a:rPr>
-              <a:t>Blue Host</a:t>
-            </a:r>
-            <a:endParaRPr lang="fr-FR" dirty="0"/>
-          </a:p>
-          <a:p>
-            <a:r>
-              <a:rPr lang="fr-FR" dirty="0"/>
-              <a:t>Avantages et Inconvénients </a:t>
-            </a:r>
-            <a:r>
-              <a:rPr lang="fr-FR" dirty="0" err="1"/>
-              <a:t>SaaS</a:t>
-            </a:r>
-            <a:r>
-              <a:rPr lang="fr-FR" dirty="0"/>
-              <a:t>: </a:t>
-            </a:r>
-            <a:r>
-              <a:rPr lang="fr-FR" dirty="0">
-                <a:hlinkClick r:id="rId5"/>
-              </a:rPr>
-              <a:t>Le coin des Entrepreneurs</a:t>
-            </a:r>
-            <a:r>
-              <a:rPr lang="fr-FR" dirty="0"/>
-              <a:t> ; </a:t>
-            </a:r>
-            <a:r>
-              <a:rPr lang="fr-FR" dirty="0" err="1">
-                <a:hlinkClick r:id="rId6"/>
-              </a:rPr>
-              <a:t>LeBigData.fr</a:t>
-            </a:r>
-            <a:endParaRPr lang="fr-FR" dirty="0"/>
-          </a:p>
-          <a:p>
-            <a:endParaRPr lang="fr-FR" dirty="0"/>
-          </a:p>
-        </p:txBody>
-      </p:sp>
     </p:spTree>
     <p:extLst>
       <p:ext uri="{BB962C8B-B14F-4D97-AF65-F5344CB8AC3E}">
-        <p14:creationId xmlns:p14="http://schemas.microsoft.com/office/powerpoint/2010/main" val="1064710970"/>
+        <p14:creationId xmlns:p14="http://schemas.microsoft.com/office/powerpoint/2010/main" val="1992179877"/>
       </p:ext>
     </p:extLst>
   </p:cSld>
@@ -4352,7 +4209,16 @@
                 </a:solidFill>
                 <a:latin typeface="Apple Braille" pitchFamily="2" charset="0"/>
               </a:rPr>
-              <a:t>3. Choix technique : customisation</a:t>
+              <a:t>Package </a:t>
+            </a:r>
+            <a:r>
+              <a:rPr lang="fr-FR" sz="2800" b="1" dirty="0" err="1">
+                <a:solidFill>
+                  <a:schemeClr val="accent1"/>
+                </a:solidFill>
+                <a:latin typeface="Apple Braille" pitchFamily="2" charset="0"/>
+              </a:rPr>
+              <a:t>Diagram</a:t>
             </a:r>
             <a:endParaRPr lang="fr-FR" sz="2400" dirty="0"/>
           </a:p>
@@ -4380,18 +4246,19 @@
           <a:lstStyle/>
           <a:p>
             <a:r>
-              <a:rPr lang="fr-FR" dirty="0"/>
+              <a:rPr lang="fr-FR"/>
               <a:t>IT C&amp;D</a:t>
             </a:r>
+            <a:endParaRPr lang="fr-FR" dirty="0"/>
           </a:p>
         </p:txBody>
       </p:sp>
       <p:pic>
         <p:nvPicPr>
-          <p:cNvPr id="9" name="Image 8">
+          <p:cNvPr id="5" name="Image 4">
             <a:extLst>
               <a:ext uri="{FF2B5EF4-FFF2-40B4-BE49-F238E27FC236}">
-                <a16:creationId xmlns:a16="http://schemas.microsoft.com/office/drawing/2014/main" id="{D32E605E-109B-BA44-A16B-422DF8BDDAE7}"/>
+                <a16:creationId xmlns:a16="http://schemas.microsoft.com/office/drawing/2014/main" id="{37294FA2-13FA-FA4E-AB08-A9338CB13614}"/>
               </a:ext>
             </a:extLst>
           </p:cNvPr>
@@ -4408,499 +4275,18 @@
         </p:blipFill>
         <p:spPr>
           <a:xfrm>
-            <a:off x="445168" y="1108811"/>
-            <a:ext cx="2228850" cy="778377"/>
+            <a:off x="0" y="1608505"/>
+            <a:ext cx="9906000" cy="3640989"/>
           </a:xfrm>
           <a:prstGeom prst="rect">
             <a:avLst/>
           </a:prstGeom>
         </p:spPr>
       </p:pic>
-      <p:sp>
-        <p:nvSpPr>
-          <p:cNvPr id="5" name="ZoneTexte 4">
-            <a:extLst>
-              <a:ext uri="{FF2B5EF4-FFF2-40B4-BE49-F238E27FC236}">
-                <a16:creationId xmlns:a16="http://schemas.microsoft.com/office/drawing/2014/main" id="{ED8F9A6A-F0BD-5B44-89DB-ECD3534E3EEB}"/>
-              </a:ext>
-            </a:extLst>
-          </p:cNvPr>
-          <p:cNvSpPr txBox="1"/>
-          <p:nvPr/>
-        </p:nvSpPr>
-        <p:spPr>
-          <a:xfrm>
-            <a:off x="4455408" y="5987020"/>
-            <a:ext cx="5873926" cy="369332"/>
-          </a:xfrm>
-          <a:prstGeom prst="rect">
-            <a:avLst/>
-          </a:prstGeom>
-          <a:noFill/>
-        </p:spPr>
-        <p:txBody>
-          <a:bodyPr wrap="square" rtlCol="0">
-            <a:spAutoFit/>
-          </a:bodyPr>
-          <a:lstStyle/>
-          <a:p>
-            <a:r>
-              <a:rPr lang="fr-FR" dirty="0"/>
-              <a:t>Sources : </a:t>
-            </a:r>
-            <a:r>
-              <a:rPr lang="fr-FR" dirty="0">
-                <a:hlinkClick r:id="rId3"/>
-              </a:rPr>
-              <a:t>site web Odoo</a:t>
-            </a:r>
-            <a:r>
-              <a:rPr lang="fr-FR" dirty="0"/>
-              <a:t> ; </a:t>
-            </a:r>
-            <a:r>
-              <a:rPr lang="fr-FR" dirty="0">
-                <a:hlinkClick r:id="rId4"/>
-              </a:rPr>
-              <a:t>Interview du CEO d’</a:t>
-            </a:r>
-            <a:r>
-              <a:rPr lang="fr-FR" dirty="0" err="1">
-                <a:hlinkClick r:id="rId4"/>
-              </a:rPr>
-              <a:t>Odoo</a:t>
-            </a:r>
-            <a:endParaRPr lang="fr-FR" dirty="0"/>
-          </a:p>
-        </p:txBody>
-      </p:sp>
-      <p:pic>
-        <p:nvPicPr>
-          <p:cNvPr id="6" name="Image 5">
-            <a:extLst>
-              <a:ext uri="{FF2B5EF4-FFF2-40B4-BE49-F238E27FC236}">
-                <a16:creationId xmlns:a16="http://schemas.microsoft.com/office/drawing/2014/main" id="{37A205C2-896C-FD4C-A308-7B16C2709B05}"/>
-              </a:ext>
-            </a:extLst>
-          </p:cNvPr>
-          <p:cNvPicPr>
-            <a:picLocks noChangeAspect="1"/>
-          </p:cNvPicPr>
-          <p:nvPr/>
-        </p:nvPicPr>
-        <p:blipFill>
-          <a:blip r:embed="rId5"/>
-          <a:stretch>
-            <a:fillRect/>
-          </a:stretch>
-        </p:blipFill>
-        <p:spPr>
-          <a:xfrm>
-            <a:off x="7369845" y="2772437"/>
-            <a:ext cx="1389096" cy="1240495"/>
-          </a:xfrm>
-          <a:prstGeom prst="rect">
-            <a:avLst/>
-          </a:prstGeom>
-        </p:spPr>
-      </p:pic>
-      <p:pic>
-        <p:nvPicPr>
-          <p:cNvPr id="7" name="Image 6">
-            <a:extLst>
-              <a:ext uri="{FF2B5EF4-FFF2-40B4-BE49-F238E27FC236}">
-                <a16:creationId xmlns:a16="http://schemas.microsoft.com/office/drawing/2014/main" id="{E76051F4-4B81-1544-8A2C-C2D5714E5EAB}"/>
-              </a:ext>
-            </a:extLst>
-          </p:cNvPr>
-          <p:cNvPicPr>
-            <a:picLocks noChangeAspect="1"/>
-          </p:cNvPicPr>
-          <p:nvPr/>
-        </p:nvPicPr>
-        <p:blipFill>
-          <a:blip r:embed="rId6"/>
-          <a:stretch>
-            <a:fillRect/>
-          </a:stretch>
-        </p:blipFill>
-        <p:spPr>
-          <a:xfrm>
-            <a:off x="3865141" y="2808752"/>
-            <a:ext cx="1389096" cy="1240495"/>
-          </a:xfrm>
-          <a:prstGeom prst="rect">
-            <a:avLst/>
-          </a:prstGeom>
-        </p:spPr>
-      </p:pic>
-      <p:pic>
-        <p:nvPicPr>
-          <p:cNvPr id="8" name="Image 7">
-            <a:extLst>
-              <a:ext uri="{FF2B5EF4-FFF2-40B4-BE49-F238E27FC236}">
-                <a16:creationId xmlns:a16="http://schemas.microsoft.com/office/drawing/2014/main" id="{905C2DFC-ACB8-B043-8AA5-B60ADBE35E24}"/>
-              </a:ext>
-            </a:extLst>
-          </p:cNvPr>
-          <p:cNvPicPr>
-            <a:picLocks noChangeAspect="1"/>
-          </p:cNvPicPr>
-          <p:nvPr/>
-        </p:nvPicPr>
-        <p:blipFill>
-          <a:blip r:embed="rId7"/>
-          <a:stretch>
-            <a:fillRect/>
-          </a:stretch>
-        </p:blipFill>
-        <p:spPr>
-          <a:xfrm>
-            <a:off x="7369845" y="1383590"/>
-            <a:ext cx="1389096" cy="1240495"/>
-          </a:xfrm>
-          <a:prstGeom prst="rect">
-            <a:avLst/>
-          </a:prstGeom>
-        </p:spPr>
-      </p:pic>
-      <p:pic>
-        <p:nvPicPr>
-          <p:cNvPr id="10" name="Image 9">
-            <a:extLst>
-              <a:ext uri="{FF2B5EF4-FFF2-40B4-BE49-F238E27FC236}">
-                <a16:creationId xmlns:a16="http://schemas.microsoft.com/office/drawing/2014/main" id="{484B2137-608D-FB4C-8ABB-84657C7D6B02}"/>
-              </a:ext>
-            </a:extLst>
-          </p:cNvPr>
-          <p:cNvPicPr>
-            <a:picLocks noChangeAspect="1"/>
-          </p:cNvPicPr>
-          <p:nvPr/>
-        </p:nvPicPr>
-        <p:blipFill>
-          <a:blip r:embed="rId8"/>
-          <a:stretch>
-            <a:fillRect/>
-          </a:stretch>
-        </p:blipFill>
-        <p:spPr>
-          <a:xfrm>
-            <a:off x="5617493" y="2793126"/>
-            <a:ext cx="1389096" cy="1240495"/>
-          </a:xfrm>
-          <a:prstGeom prst="rect">
-            <a:avLst/>
-          </a:prstGeom>
-        </p:spPr>
-      </p:pic>
-      <p:pic>
-        <p:nvPicPr>
-          <p:cNvPr id="11" name="Image 10">
-            <a:extLst>
-              <a:ext uri="{FF2B5EF4-FFF2-40B4-BE49-F238E27FC236}">
-                <a16:creationId xmlns:a16="http://schemas.microsoft.com/office/drawing/2014/main" id="{82B75289-0F73-6E4F-8241-A54AD222A42A}"/>
-              </a:ext>
-            </a:extLst>
-          </p:cNvPr>
-          <p:cNvPicPr>
-            <a:picLocks noChangeAspect="1"/>
-          </p:cNvPicPr>
-          <p:nvPr/>
-        </p:nvPicPr>
-        <p:blipFill>
-          <a:blip r:embed="rId9"/>
-          <a:stretch>
-            <a:fillRect/>
-          </a:stretch>
-        </p:blipFill>
-        <p:spPr>
-          <a:xfrm>
-            <a:off x="2923258" y="4304786"/>
-            <a:ext cx="1365250" cy="1244600"/>
-          </a:xfrm>
-          <a:prstGeom prst="rect">
-            <a:avLst/>
-          </a:prstGeom>
-        </p:spPr>
-      </p:pic>
-      <p:pic>
-        <p:nvPicPr>
-          <p:cNvPr id="12" name="Image 11">
-            <a:extLst>
-              <a:ext uri="{FF2B5EF4-FFF2-40B4-BE49-F238E27FC236}">
-                <a16:creationId xmlns:a16="http://schemas.microsoft.com/office/drawing/2014/main" id="{87EB1381-0045-FA4F-9D2B-90DEBEC4091D}"/>
-              </a:ext>
-            </a:extLst>
-          </p:cNvPr>
-          <p:cNvPicPr>
-            <a:picLocks noChangeAspect="1"/>
-          </p:cNvPicPr>
-          <p:nvPr/>
-        </p:nvPicPr>
-        <p:blipFill>
-          <a:blip r:embed="rId10"/>
-          <a:stretch>
-            <a:fillRect/>
-          </a:stretch>
-        </p:blipFill>
-        <p:spPr>
-          <a:xfrm>
-            <a:off x="3865141" y="1379485"/>
-            <a:ext cx="1365250" cy="1244600"/>
-          </a:xfrm>
-          <a:prstGeom prst="rect">
-            <a:avLst/>
-          </a:prstGeom>
-        </p:spPr>
-      </p:pic>
-      <p:sp>
-        <p:nvSpPr>
-          <p:cNvPr id="13" name="ZoneTexte 12">
-            <a:extLst>
-              <a:ext uri="{FF2B5EF4-FFF2-40B4-BE49-F238E27FC236}">
-                <a16:creationId xmlns:a16="http://schemas.microsoft.com/office/drawing/2014/main" id="{4FD7283B-D920-6845-87FC-1842732B17C7}"/>
-              </a:ext>
-            </a:extLst>
-          </p:cNvPr>
-          <p:cNvSpPr txBox="1"/>
-          <p:nvPr/>
-        </p:nvSpPr>
-        <p:spPr>
-          <a:xfrm>
-            <a:off x="7369845" y="4272634"/>
-            <a:ext cx="1365250" cy="1200329"/>
-          </a:xfrm>
-          <a:prstGeom prst="rect">
-            <a:avLst/>
-          </a:prstGeom>
-          <a:solidFill>
-            <a:schemeClr val="accent1"/>
-          </a:solidFill>
-          <a:ln>
-            <a:solidFill>
-              <a:schemeClr val="tx1"/>
-            </a:solidFill>
-          </a:ln>
-        </p:spPr>
-        <p:txBody>
-          <a:bodyPr wrap="square" rtlCol="0">
-            <a:spAutoFit/>
-          </a:bodyPr>
-          <a:lstStyle/>
-          <a:p>
-            <a:pPr algn="ctr"/>
-            <a:r>
-              <a:rPr lang="fr-FR" b="1" dirty="0">
-                <a:solidFill>
-                  <a:schemeClr val="bg1"/>
-                </a:solidFill>
-              </a:rPr>
-              <a:t>+ Modules</a:t>
-            </a:r>
-          </a:p>
-          <a:p>
-            <a:pPr algn="ctr"/>
-            <a:r>
-              <a:rPr lang="fr-FR" b="1" dirty="0">
-                <a:solidFill>
-                  <a:schemeClr val="bg1"/>
-                </a:solidFill>
-              </a:rPr>
-              <a:t>IT C&amp;D </a:t>
-            </a:r>
-          </a:p>
-          <a:p>
-            <a:pPr algn="ctr"/>
-            <a:r>
-              <a:rPr lang="fr-FR" b="1" dirty="0">
-                <a:solidFill>
-                  <a:schemeClr val="bg1"/>
-                </a:solidFill>
-              </a:rPr>
-              <a:t>pour</a:t>
-            </a:r>
-          </a:p>
-          <a:p>
-            <a:pPr algn="ctr"/>
-            <a:r>
-              <a:rPr lang="fr-FR" b="1" dirty="0">
-                <a:solidFill>
-                  <a:schemeClr val="bg1"/>
-                </a:solidFill>
-              </a:rPr>
-              <a:t>OC Pizza</a:t>
-            </a:r>
-          </a:p>
-        </p:txBody>
-      </p:sp>
-      <p:pic>
-        <p:nvPicPr>
-          <p:cNvPr id="14" name="Image 13">
-            <a:extLst>
-              <a:ext uri="{FF2B5EF4-FFF2-40B4-BE49-F238E27FC236}">
-                <a16:creationId xmlns:a16="http://schemas.microsoft.com/office/drawing/2014/main" id="{87F311DA-16F8-D140-BDFF-F1EDEECD9127}"/>
-              </a:ext>
-            </a:extLst>
-          </p:cNvPr>
-          <p:cNvPicPr>
-            <a:picLocks noChangeAspect="1"/>
-          </p:cNvPicPr>
-          <p:nvPr/>
-        </p:nvPicPr>
-        <p:blipFill>
-          <a:blip r:embed="rId11"/>
-          <a:stretch>
-            <a:fillRect/>
-          </a:stretch>
-        </p:blipFill>
-        <p:spPr>
-          <a:xfrm>
-            <a:off x="5617493" y="1379485"/>
-            <a:ext cx="1365250" cy="1244600"/>
-          </a:xfrm>
-          <a:prstGeom prst="rect">
-            <a:avLst/>
-          </a:prstGeom>
-        </p:spPr>
-      </p:pic>
-      <p:sp>
-        <p:nvSpPr>
-          <p:cNvPr id="4" name="ZoneTexte 3">
-            <a:extLst>
-              <a:ext uri="{FF2B5EF4-FFF2-40B4-BE49-F238E27FC236}">
-                <a16:creationId xmlns:a16="http://schemas.microsoft.com/office/drawing/2014/main" id="{CC1AA28F-8125-2F47-A6D3-86B6A8BD51C2}"/>
-              </a:ext>
-            </a:extLst>
-          </p:cNvPr>
-          <p:cNvSpPr txBox="1"/>
-          <p:nvPr/>
-        </p:nvSpPr>
-        <p:spPr>
-          <a:xfrm>
-            <a:off x="1319969" y="2215040"/>
-            <a:ext cx="2432373" cy="830997"/>
-          </a:xfrm>
-          <a:prstGeom prst="rect">
-            <a:avLst/>
-          </a:prstGeom>
-          <a:noFill/>
-        </p:spPr>
-        <p:txBody>
-          <a:bodyPr wrap="square" rtlCol="0">
-            <a:spAutoFit/>
-          </a:bodyPr>
-          <a:lstStyle/>
-          <a:p>
-            <a:r>
-              <a:rPr lang="fr-FR" sz="1600" dirty="0">
-                <a:solidFill>
-                  <a:schemeClr val="accent1"/>
-                </a:solidFill>
-              </a:rPr>
-              <a:t>Des modules conçus pour être intégrés ensemble et prêts à l’usage</a:t>
-            </a:r>
-          </a:p>
-        </p:txBody>
-      </p:sp>
-      <p:sp>
-        <p:nvSpPr>
-          <p:cNvPr id="15" name="ZoneTexte 14">
-            <a:extLst>
-              <a:ext uri="{FF2B5EF4-FFF2-40B4-BE49-F238E27FC236}">
-                <a16:creationId xmlns:a16="http://schemas.microsoft.com/office/drawing/2014/main" id="{7A1D9EF9-3993-464A-9C55-49C323C2C5FC}"/>
-              </a:ext>
-            </a:extLst>
-          </p:cNvPr>
-          <p:cNvSpPr txBox="1"/>
-          <p:nvPr/>
-        </p:nvSpPr>
-        <p:spPr>
-          <a:xfrm>
-            <a:off x="445168" y="4304786"/>
-            <a:ext cx="2432373" cy="1323439"/>
-          </a:xfrm>
-          <a:prstGeom prst="rect">
-            <a:avLst/>
-          </a:prstGeom>
-          <a:noFill/>
-        </p:spPr>
-        <p:txBody>
-          <a:bodyPr wrap="square" rtlCol="0">
-            <a:spAutoFit/>
-          </a:bodyPr>
-          <a:lstStyle/>
-          <a:p>
-            <a:r>
-              <a:rPr lang="fr-FR" sz="1600" dirty="0">
-                <a:solidFill>
-                  <a:schemeClr val="accent1"/>
-                </a:solidFill>
-              </a:rPr>
-              <a:t>Avec </a:t>
-            </a:r>
-            <a:r>
-              <a:rPr lang="fr-FR" sz="1600" dirty="0" err="1">
-                <a:solidFill>
-                  <a:schemeClr val="accent1"/>
-                </a:solidFill>
-              </a:rPr>
-              <a:t>Odoo.sh</a:t>
-            </a:r>
-            <a:r>
-              <a:rPr lang="fr-FR" sz="1600" dirty="0">
-                <a:solidFill>
-                  <a:schemeClr val="accent1"/>
-                </a:solidFill>
-              </a:rPr>
-              <a:t> un hébergement sûr et adapté aux évolutions du système de gestion d’OC Pizza</a:t>
-            </a:r>
-          </a:p>
-        </p:txBody>
-      </p:sp>
-      <p:sp>
-        <p:nvSpPr>
-          <p:cNvPr id="16" name="ZoneTexte 15">
-            <a:extLst>
-              <a:ext uri="{FF2B5EF4-FFF2-40B4-BE49-F238E27FC236}">
-                <a16:creationId xmlns:a16="http://schemas.microsoft.com/office/drawing/2014/main" id="{F1B9C3C4-DC59-294B-A278-C45759C2CBDD}"/>
-              </a:ext>
-            </a:extLst>
-          </p:cNvPr>
-          <p:cNvSpPr txBox="1"/>
-          <p:nvPr/>
-        </p:nvSpPr>
-        <p:spPr>
-          <a:xfrm>
-            <a:off x="4937472" y="4281289"/>
-            <a:ext cx="2432373" cy="1077218"/>
-          </a:xfrm>
-          <a:prstGeom prst="rect">
-            <a:avLst/>
-          </a:prstGeom>
-          <a:noFill/>
-        </p:spPr>
-        <p:txBody>
-          <a:bodyPr wrap="square" rtlCol="0">
-            <a:spAutoFit/>
-          </a:bodyPr>
-          <a:lstStyle/>
-          <a:p>
-            <a:r>
-              <a:rPr lang="fr-FR" sz="1600" dirty="0">
-                <a:solidFill>
-                  <a:schemeClr val="accent1"/>
-                </a:solidFill>
-              </a:rPr>
-              <a:t>Une personnalisation poussée des modules + création de modules spécifiques pour OC Pizza</a:t>
-            </a:r>
-          </a:p>
-        </p:txBody>
-      </p:sp>
     </p:spTree>
     <p:extLst>
       <p:ext uri="{BB962C8B-B14F-4D97-AF65-F5344CB8AC3E}">
-        <p14:creationId xmlns:p14="http://schemas.microsoft.com/office/powerpoint/2010/main" val="2479870680"/>
+        <p14:creationId xmlns:p14="http://schemas.microsoft.com/office/powerpoint/2010/main" val="2493743640"/>
       </p:ext>
     </p:extLst>
   </p:cSld>
@@ -4957,13 +4343,31 @@
           <a:p>
             <a:pPr algn="l"/>
             <a:r>
-              <a:rPr lang="fr-FR" sz="2800" b="1" dirty="0">
+              <a:rPr lang="fr-FR" sz="2800" b="1" dirty="0" err="1">
                 <a:solidFill>
                   <a:schemeClr val="accent1"/>
                 </a:solidFill>
                 <a:latin typeface="Apple Braille" pitchFamily="2" charset="0"/>
               </a:rPr>
-              <a:t>3. Notre proposition : Evaluation de la Solution</a:t>
+              <a:t>Order</a:t>
+            </a:r>
+            <a:r>
+              <a:rPr lang="fr-FR" sz="2800" b="1" dirty="0">
+                <a:solidFill>
+                  <a:schemeClr val="accent1"/>
+                </a:solidFill>
+                <a:latin typeface="Apple Braille" pitchFamily="2" charset="0"/>
+              </a:rPr>
+              <a:t> </a:t>
+            </a:r>
+            <a:r>
+              <a:rPr lang="fr-FR" sz="2800" b="1" dirty="0" err="1">
+                <a:solidFill>
+                  <a:schemeClr val="accent1"/>
+                </a:solidFill>
+                <a:latin typeface="Apple Braille" pitchFamily="2" charset="0"/>
+              </a:rPr>
+              <a:t>Process</a:t>
             </a:r>
             <a:endParaRPr lang="fr-FR" sz="2400" dirty="0"/>
           </a:p>
@@ -4991,568 +4395,19 @@
           <a:lstStyle/>
           <a:p>
             <a:r>
-              <a:rPr lang="fr-FR" dirty="0"/>
+              <a:rPr lang="fr-FR"/>
               <a:t>IT C&amp;D</a:t>
             </a:r>
-          </a:p>
-        </p:txBody>
-      </p:sp>
-      <p:graphicFrame>
-        <p:nvGraphicFramePr>
-          <p:cNvPr id="5" name="Tableau 4">
+            <a:endParaRPr lang="fr-FR" dirty="0"/>
+          </a:p>
+        </p:txBody>
+      </p:sp>
+      <p:pic>
+        <p:nvPicPr>
+          <p:cNvPr id="5" name="Image 4">
             <a:extLst>
               <a:ext uri="{FF2B5EF4-FFF2-40B4-BE49-F238E27FC236}">
-                <a16:creationId xmlns:a16="http://schemas.microsoft.com/office/drawing/2014/main" id="{0661E393-E81C-7941-B994-042297F4B271}"/>
-              </a:ext>
-            </a:extLst>
-          </p:cNvPr>
-          <p:cNvGraphicFramePr>
-            <a:graphicFrameLocks noGrp="1"/>
-          </p:cNvGraphicFramePr>
-          <p:nvPr>
-            <p:extLst>
-              <p:ext uri="{D42A27DB-BD31-4B8C-83A1-F6EECF244321}">
-                <p14:modId xmlns:p14="http://schemas.microsoft.com/office/powerpoint/2010/main" val="1467294804"/>
-              </p:ext>
-            </p:extLst>
-          </p:nvPr>
-        </p:nvGraphicFramePr>
-        <p:xfrm>
-          <a:off x="414700" y="1040815"/>
-          <a:ext cx="8808322" cy="5177333"/>
-        </p:xfrm>
-        <a:graphic>
-          <a:graphicData uri="http://schemas.openxmlformats.org/drawingml/2006/table">
-            <a:tbl>
-              <a:tblPr firstRow="1" bandRow="1">
-                <a:tableStyleId>{5C22544A-7EE6-4342-B048-85BDC9FD1C3A}</a:tableStyleId>
-              </a:tblPr>
-              <a:tblGrid>
-                <a:gridCol w="1536694">
-                  <a:extLst>
-                    <a:ext uri="{9D8B030D-6E8A-4147-A177-3AD203B41FA5}">
-                      <a16:colId xmlns:a16="http://schemas.microsoft.com/office/drawing/2014/main" val="3916403332"/>
-                    </a:ext>
-                  </a:extLst>
-                </a:gridCol>
-                <a:gridCol w="7271628">
-                  <a:extLst>
-                    <a:ext uri="{9D8B030D-6E8A-4147-A177-3AD203B41FA5}">
-                      <a16:colId xmlns:a16="http://schemas.microsoft.com/office/drawing/2014/main" val="3320272912"/>
-                    </a:ext>
-                  </a:extLst>
-                </a:gridCol>
-              </a:tblGrid>
-              <a:tr h="388753">
-                <a:tc>
-                  <a:txBody>
-                    <a:bodyPr/>
-                    <a:lstStyle/>
-                    <a:p>
-                      <a:r>
-                        <a:rPr lang="fr-FR" sz="1400" dirty="0"/>
-                        <a:t>Critère</a:t>
-                      </a:r>
-                    </a:p>
-                  </a:txBody>
-                  <a:tcPr/>
-                </a:tc>
-                <a:tc>
-                  <a:txBody>
-                    <a:bodyPr/>
-                    <a:lstStyle/>
-                    <a:p>
-                      <a:endParaRPr lang="fr-FR" sz="1400" dirty="0"/>
-                    </a:p>
-                  </a:txBody>
-                  <a:tcPr/>
-                </a:tc>
-                <a:extLst>
-                  <a:ext uri="{0D108BD9-81ED-4DB2-BD59-A6C34878D82A}">
-                    <a16:rowId xmlns:a16="http://schemas.microsoft.com/office/drawing/2014/main" val="4187171803"/>
-                  </a:ext>
-                </a:extLst>
-              </a:tr>
-              <a:tr h="498912">
-                <a:tc>
-                  <a:txBody>
-                    <a:bodyPr/>
-                    <a:lstStyle/>
-                    <a:p>
-                      <a:pPr marL="0" marR="0" lvl="0" indent="0" algn="l" defTabSz="914400" rtl="0" eaLnBrk="1" fontAlgn="auto" latinLnBrk="0" hangingPunct="1">
-                        <a:lnSpc>
-                          <a:spcPct val="100000"/>
-                        </a:lnSpc>
-                        <a:spcBef>
-                          <a:spcPts val="0"/>
-                        </a:spcBef>
-                        <a:spcAft>
-                          <a:spcPts val="0"/>
-                        </a:spcAft>
-                        <a:buClrTx/>
-                        <a:buSzTx/>
-                        <a:buFontTx/>
-                        <a:buNone/>
-                        <a:tabLst/>
-                        <a:defRPr/>
-                      </a:pPr>
-                      <a:r>
-                        <a:rPr lang="fr-FR" sz="1400" dirty="0"/>
-                        <a:t>Réponse mandat</a:t>
-                      </a:r>
-                    </a:p>
-                  </a:txBody>
-                  <a:tcPr/>
-                </a:tc>
-                <a:tc>
-                  <a:txBody>
-                    <a:bodyPr/>
-                    <a:lstStyle/>
-                    <a:p>
-                      <a:r>
-                        <a:rPr lang="fr-FR" sz="1400" b="1" dirty="0"/>
-                        <a:t>Bonne : </a:t>
-                      </a:r>
-                    </a:p>
-                    <a:p>
-                      <a:r>
-                        <a:rPr lang="fr-FR" sz="1400" b="0" dirty="0"/>
-                        <a:t>Customisation poussée </a:t>
-                      </a:r>
-                      <a:endParaRPr lang="fr-FR" sz="1400" dirty="0"/>
-                    </a:p>
-                  </a:txBody>
-                  <a:tcPr>
-                    <a:solidFill>
-                      <a:schemeClr val="accent6">
-                        <a:lumMod val="60000"/>
-                        <a:lumOff val="40000"/>
-                      </a:schemeClr>
-                    </a:solidFill>
-                  </a:tcPr>
-                </a:tc>
-                <a:extLst>
-                  <a:ext uri="{0D108BD9-81ED-4DB2-BD59-A6C34878D82A}">
-                    <a16:rowId xmlns:a16="http://schemas.microsoft.com/office/drawing/2014/main" val="1132881627"/>
-                  </a:ext>
-                </a:extLst>
-              </a:tr>
-              <a:tr h="543188">
-                <a:tc>
-                  <a:txBody>
-                    <a:bodyPr/>
-                    <a:lstStyle/>
-                    <a:p>
-                      <a:r>
-                        <a:rPr lang="fr-FR" sz="1400" dirty="0"/>
-                        <a:t>Croissance OC Pizza</a:t>
-                      </a:r>
-                    </a:p>
-                  </a:txBody>
-                  <a:tcPr/>
-                </a:tc>
-                <a:tc>
-                  <a:txBody>
-                    <a:bodyPr/>
-                    <a:lstStyle/>
-                    <a:p>
-                      <a:r>
-                        <a:rPr lang="fr-FR" sz="1400" b="1" dirty="0"/>
-                        <a:t>Très Bonne : </a:t>
-                      </a:r>
-                    </a:p>
-                    <a:p>
-                      <a:r>
-                        <a:rPr lang="fr-FR" sz="1400" dirty="0" err="1"/>
-                        <a:t>Odoo</a:t>
-                      </a:r>
-                      <a:r>
-                        <a:rPr lang="fr-FR" sz="1400" dirty="0"/>
-                        <a:t> est adapté à la croissance d’une entreprise (notamment la base de données </a:t>
-                      </a:r>
-                      <a:r>
-                        <a:rPr lang="fr-FR" sz="1400" dirty="0" err="1"/>
-                        <a:t>PostgreeSQL</a:t>
-                      </a:r>
-                      <a:r>
-                        <a:rPr lang="fr-FR" sz="1400" dirty="0"/>
-                        <a:t>)</a:t>
-                      </a:r>
-                    </a:p>
-                  </a:txBody>
-                  <a:tcPr>
-                    <a:solidFill>
-                      <a:schemeClr val="accent6">
-                        <a:lumMod val="60000"/>
-                        <a:lumOff val="40000"/>
-                      </a:schemeClr>
-                    </a:solidFill>
-                  </a:tcPr>
-                </a:tc>
-                <a:extLst>
-                  <a:ext uri="{0D108BD9-81ED-4DB2-BD59-A6C34878D82A}">
-                    <a16:rowId xmlns:a16="http://schemas.microsoft.com/office/drawing/2014/main" val="2019670362"/>
-                  </a:ext>
-                </a:extLst>
-              </a:tr>
-              <a:tr h="543188">
-                <a:tc>
-                  <a:txBody>
-                    <a:bodyPr/>
-                    <a:lstStyle/>
-                    <a:p>
-                      <a:r>
-                        <a:rPr lang="fr-FR" sz="1400" dirty="0"/>
-                        <a:t>Coût d’exploitation</a:t>
-                      </a:r>
-                    </a:p>
-                  </a:txBody>
-                  <a:tcPr/>
-                </a:tc>
-                <a:tc>
-                  <a:txBody>
-                    <a:bodyPr/>
-                    <a:lstStyle/>
-                    <a:p>
-                      <a:r>
-                        <a:rPr lang="fr-FR" sz="1400" b="1" dirty="0"/>
-                        <a:t>Faible : </a:t>
-                      </a:r>
-                    </a:p>
-                    <a:p>
-                      <a:r>
-                        <a:rPr lang="fr-FR" sz="1400" dirty="0"/>
-                        <a:t>Essentiellement les abonnements à la solution</a:t>
-                      </a:r>
-                    </a:p>
-                  </a:txBody>
-                  <a:tcPr>
-                    <a:solidFill>
-                      <a:schemeClr val="accent6">
-                        <a:lumMod val="60000"/>
-                        <a:lumOff val="40000"/>
-                      </a:schemeClr>
-                    </a:solidFill>
-                  </a:tcPr>
-                </a:tc>
-                <a:extLst>
-                  <a:ext uri="{0D108BD9-81ED-4DB2-BD59-A6C34878D82A}">
-                    <a16:rowId xmlns:a16="http://schemas.microsoft.com/office/drawing/2014/main" val="744804136"/>
-                  </a:ext>
-                </a:extLst>
-              </a:tr>
-              <a:tr h="498912">
-                <a:tc>
-                  <a:txBody>
-                    <a:bodyPr/>
-                    <a:lstStyle/>
-                    <a:p>
-                      <a:r>
-                        <a:rPr lang="fr-FR" sz="1400" dirty="0"/>
-                        <a:t>Délai</a:t>
-                      </a:r>
-                    </a:p>
-                  </a:txBody>
-                  <a:tcPr/>
-                </a:tc>
-                <a:tc>
-                  <a:txBody>
-                    <a:bodyPr/>
-                    <a:lstStyle/>
-                    <a:p>
-                      <a:r>
-                        <a:rPr lang="fr-FR" sz="1400" b="1" dirty="0"/>
-                        <a:t>Court : </a:t>
-                      </a:r>
-                    </a:p>
-                    <a:p>
-                      <a:r>
-                        <a:rPr lang="fr-FR" sz="1400" b="0" dirty="0"/>
-                        <a:t>Simple adaptation de modules existants</a:t>
-                      </a:r>
-                    </a:p>
-                  </a:txBody>
-                  <a:tcPr>
-                    <a:solidFill>
-                      <a:schemeClr val="accent6">
-                        <a:lumMod val="60000"/>
-                        <a:lumOff val="40000"/>
-                      </a:schemeClr>
-                    </a:solidFill>
-                  </a:tcPr>
-                </a:tc>
-                <a:extLst>
-                  <a:ext uri="{0D108BD9-81ED-4DB2-BD59-A6C34878D82A}">
-                    <a16:rowId xmlns:a16="http://schemas.microsoft.com/office/drawing/2014/main" val="1210363784"/>
-                  </a:ext>
-                </a:extLst>
-              </a:tr>
-              <a:tr h="543188">
-                <a:tc>
-                  <a:txBody>
-                    <a:bodyPr/>
-                    <a:lstStyle/>
-                    <a:p>
-                      <a:pPr marL="0" marR="0" lvl="0" indent="0" algn="l" defTabSz="914400" rtl="0" eaLnBrk="1" fontAlgn="auto" latinLnBrk="0" hangingPunct="1">
-                        <a:lnSpc>
-                          <a:spcPct val="100000"/>
-                        </a:lnSpc>
-                        <a:spcBef>
-                          <a:spcPts val="0"/>
-                        </a:spcBef>
-                        <a:spcAft>
-                          <a:spcPts val="0"/>
-                        </a:spcAft>
-                        <a:buClrTx/>
-                        <a:buSzTx/>
-                        <a:buFontTx/>
-                        <a:buNone/>
-                        <a:tabLst/>
-                        <a:defRPr/>
-                      </a:pPr>
-                      <a:r>
-                        <a:rPr lang="fr-FR" sz="1400" dirty="0"/>
-                        <a:t>Difficulté technique</a:t>
-                      </a:r>
-                    </a:p>
-                  </a:txBody>
-                  <a:tcPr/>
-                </a:tc>
-                <a:tc>
-                  <a:txBody>
-                    <a:bodyPr/>
-                    <a:lstStyle/>
-                    <a:p>
-                      <a:r>
-                        <a:rPr lang="fr-FR" sz="1400" b="1" dirty="0"/>
-                        <a:t>Limitée : </a:t>
-                      </a:r>
-                    </a:p>
-                    <a:p>
-                      <a:r>
-                        <a:rPr lang="fr-FR" sz="1400" b="0" dirty="0"/>
-                        <a:t>Nombreux modules déjà existants</a:t>
-                      </a:r>
-                      <a:r>
-                        <a:rPr lang="fr-FR" sz="1400" dirty="0"/>
-                        <a:t>, hébergement maîtrisé</a:t>
-                      </a:r>
-                    </a:p>
-                  </a:txBody>
-                  <a:tcPr>
-                    <a:solidFill>
-                      <a:schemeClr val="accent6">
-                        <a:lumMod val="60000"/>
-                        <a:lumOff val="40000"/>
-                      </a:schemeClr>
-                    </a:solidFill>
-                  </a:tcPr>
-                </a:tc>
-                <a:extLst>
-                  <a:ext uri="{0D108BD9-81ED-4DB2-BD59-A6C34878D82A}">
-                    <a16:rowId xmlns:a16="http://schemas.microsoft.com/office/drawing/2014/main" val="478184333"/>
-                  </a:ext>
-                </a:extLst>
-              </a:tr>
-              <a:tr h="498912">
-                <a:tc>
-                  <a:txBody>
-                    <a:bodyPr/>
-                    <a:lstStyle/>
-                    <a:p>
-                      <a:r>
-                        <a:rPr lang="fr-FR" sz="1400" dirty="0"/>
-                        <a:t>Sécurité</a:t>
-                      </a:r>
-                    </a:p>
-                  </a:txBody>
-                  <a:tcPr/>
-                </a:tc>
-                <a:tc>
-                  <a:txBody>
-                    <a:bodyPr/>
-                    <a:lstStyle/>
-                    <a:p>
-                      <a:r>
-                        <a:rPr lang="fr-FR" sz="1400" b="1" dirty="0"/>
-                        <a:t>Forte : </a:t>
-                      </a:r>
-                      <a:endParaRPr lang="fr-FR" sz="1400" b="0" dirty="0"/>
-                    </a:p>
-                    <a:p>
-                      <a:r>
-                        <a:rPr lang="fr-FR" sz="1400" b="0" dirty="0"/>
-                        <a:t>Traitée de bout en bout par les opérateurs</a:t>
-                      </a:r>
-                    </a:p>
-                  </a:txBody>
-                  <a:tcPr>
-                    <a:solidFill>
-                      <a:schemeClr val="accent6">
-                        <a:lumMod val="60000"/>
-                        <a:lumOff val="40000"/>
-                      </a:schemeClr>
-                    </a:solidFill>
-                  </a:tcPr>
-                </a:tc>
-                <a:extLst>
-                  <a:ext uri="{0D108BD9-81ED-4DB2-BD59-A6C34878D82A}">
-                    <a16:rowId xmlns:a16="http://schemas.microsoft.com/office/drawing/2014/main" val="3719089621"/>
-                  </a:ext>
-                </a:extLst>
-              </a:tr>
-              <a:tr h="498912">
-                <a:tc>
-                  <a:txBody>
-                    <a:bodyPr/>
-                    <a:lstStyle/>
-                    <a:p>
-                      <a:r>
-                        <a:rPr lang="fr-FR" sz="1400" dirty="0"/>
-                        <a:t>Fiabilité</a:t>
-                      </a:r>
-                    </a:p>
-                  </a:txBody>
-                  <a:tcPr/>
-                </a:tc>
-                <a:tc>
-                  <a:txBody>
-                    <a:bodyPr/>
-                    <a:lstStyle/>
-                    <a:p>
-                      <a:r>
-                        <a:rPr lang="fr-FR" sz="1400" b="1" dirty="0"/>
-                        <a:t>Forte </a:t>
-                      </a:r>
-                      <a:r>
-                        <a:rPr lang="fr-FR" sz="1400" dirty="0"/>
-                        <a:t>: </a:t>
-                      </a:r>
-                    </a:p>
-                    <a:p>
-                      <a:r>
-                        <a:rPr lang="fr-FR" sz="1400" dirty="0"/>
-                        <a:t>Solution éprouvée (4 Millions d’utilisateurs)</a:t>
-                      </a:r>
-                    </a:p>
-                  </a:txBody>
-                  <a:tcPr>
-                    <a:solidFill>
-                      <a:schemeClr val="accent6">
-                        <a:lumMod val="60000"/>
-                        <a:lumOff val="40000"/>
-                      </a:schemeClr>
-                    </a:solidFill>
-                  </a:tcPr>
-                </a:tc>
-                <a:extLst>
-                  <a:ext uri="{0D108BD9-81ED-4DB2-BD59-A6C34878D82A}">
-                    <a16:rowId xmlns:a16="http://schemas.microsoft.com/office/drawing/2014/main" val="1763363078"/>
-                  </a:ext>
-                </a:extLst>
-              </a:tr>
-              <a:tr h="543188">
-                <a:tc>
-                  <a:txBody>
-                    <a:bodyPr/>
-                    <a:lstStyle/>
-                    <a:p>
-                      <a:r>
-                        <a:rPr lang="fr-FR" sz="1400" dirty="0"/>
-                        <a:t>Coût de conception</a:t>
-                      </a:r>
-                    </a:p>
-                  </a:txBody>
-                  <a:tcPr/>
-                </a:tc>
-                <a:tc>
-                  <a:txBody>
-                    <a:bodyPr/>
-                    <a:lstStyle/>
-                    <a:p>
-                      <a:r>
-                        <a:rPr lang="fr-FR" sz="1400" b="1" dirty="0"/>
-                        <a:t>Faible : </a:t>
-                      </a:r>
-                    </a:p>
-                    <a:p>
-                      <a:r>
-                        <a:rPr lang="fr-FR" sz="1400" dirty="0"/>
-                        <a:t>Adaptation de modules existants, langage connu de l’équipe</a:t>
-                      </a:r>
-                    </a:p>
-                  </a:txBody>
-                  <a:tcPr>
-                    <a:solidFill>
-                      <a:schemeClr val="accent6">
-                        <a:lumMod val="60000"/>
-                        <a:lumOff val="40000"/>
-                      </a:schemeClr>
-                    </a:solidFill>
-                  </a:tcPr>
-                </a:tc>
-                <a:extLst>
-                  <a:ext uri="{0D108BD9-81ED-4DB2-BD59-A6C34878D82A}">
-                    <a16:rowId xmlns:a16="http://schemas.microsoft.com/office/drawing/2014/main" val="2023212015"/>
-                  </a:ext>
-                </a:extLst>
-              </a:tr>
-              <a:tr h="543188">
-                <a:tc>
-                  <a:txBody>
-                    <a:bodyPr/>
-                    <a:lstStyle/>
-                    <a:p>
-                      <a:r>
-                        <a:rPr lang="fr-FR" sz="1400" dirty="0"/>
-                        <a:t>Evolutions</a:t>
-                      </a:r>
-                    </a:p>
-                  </a:txBody>
-                  <a:tcPr/>
-                </a:tc>
-                <a:tc>
-                  <a:txBody>
-                    <a:bodyPr/>
-                    <a:lstStyle/>
-                    <a:p>
-                      <a:r>
-                        <a:rPr lang="fr-FR" sz="1400" b="1" dirty="0"/>
-                        <a:t>Forte : </a:t>
-                      </a:r>
-                    </a:p>
-                    <a:p>
-                      <a:r>
-                        <a:rPr lang="fr-FR" sz="1400" dirty="0"/>
-                        <a:t>Code source disponible dans un langage maîtrisé par IT C&amp;D</a:t>
-                      </a:r>
-                    </a:p>
-                  </a:txBody>
-                  <a:tcPr>
-                    <a:solidFill>
-                      <a:schemeClr val="accent6">
-                        <a:lumMod val="60000"/>
-                        <a:lumOff val="40000"/>
-                      </a:schemeClr>
-                    </a:solidFill>
-                  </a:tcPr>
-                </a:tc>
-                <a:extLst>
-                  <a:ext uri="{0D108BD9-81ED-4DB2-BD59-A6C34878D82A}">
-                    <a16:rowId xmlns:a16="http://schemas.microsoft.com/office/drawing/2014/main" val="1673864506"/>
-                  </a:ext>
-                </a:extLst>
-              </a:tr>
-            </a:tbl>
-          </a:graphicData>
-        </a:graphic>
-      </p:graphicFrame>
-      <p:pic>
-        <p:nvPicPr>
-          <p:cNvPr id="6" name="Image 5">
-            <a:extLst>
-              <a:ext uri="{FF2B5EF4-FFF2-40B4-BE49-F238E27FC236}">
-                <a16:creationId xmlns:a16="http://schemas.microsoft.com/office/drawing/2014/main" id="{EBADBFA6-3382-8F4A-9F00-CAC1680C3F40}"/>
+                <a16:creationId xmlns:a16="http://schemas.microsoft.com/office/drawing/2014/main" id="{F97A350A-80E5-0847-9C0C-1CE04062123E}"/>
               </a:ext>
             </a:extLst>
           </p:cNvPr>
@@ -5569,21 +4424,18 @@
         </p:blipFill>
         <p:spPr>
           <a:xfrm>
-            <a:off x="2048191" y="1040815"/>
-            <a:ext cx="920788" cy="321565"/>
+            <a:off x="3856161" y="312516"/>
+            <a:ext cx="4298485" cy="5631084"/>
           </a:xfrm>
           <a:prstGeom prst="rect">
             <a:avLst/>
           </a:prstGeom>
-          <a:solidFill>
-            <a:schemeClr val="bg1"/>
-          </a:solidFill>
         </p:spPr>
       </p:pic>
     </p:spTree>
     <p:extLst>
       <p:ext uri="{BB962C8B-B14F-4D97-AF65-F5344CB8AC3E}">
-        <p14:creationId xmlns:p14="http://schemas.microsoft.com/office/powerpoint/2010/main" val="2244913274"/>
+        <p14:creationId xmlns:p14="http://schemas.microsoft.com/office/powerpoint/2010/main" val="3475876367"/>
       </p:ext>
     </p:extLst>
   </p:cSld>
@@ -5646,7 +4498,16 @@
                 </a:solidFill>
                 <a:latin typeface="Apple Braille" pitchFamily="2" charset="0"/>
               </a:rPr>
-              <a:t>3. Notre proposition :</a:t>
+              <a:t>3. Choix technique: Simplicité du mode </a:t>
+            </a:r>
+            <a:r>
+              <a:rPr lang="fr-FR" sz="2800" b="1" dirty="0" err="1">
+                <a:solidFill>
+                  <a:schemeClr val="accent1"/>
+                </a:solidFill>
+                <a:latin typeface="Apple Braille" pitchFamily="2" charset="0"/>
+              </a:rPr>
+              <a:t>SaaS</a:t>
             </a:r>
             <a:endParaRPr lang="fr-FR" sz="2400" dirty="0"/>
           </a:p>
@@ -5680,12 +4541,46 @@
           </a:p>
         </p:txBody>
       </p:sp>
-      <p:sp>
-        <p:nvSpPr>
-          <p:cNvPr id="5" name="ZoneTexte 4">
+      <p:pic>
+        <p:nvPicPr>
+          <p:cNvPr id="5" name="Image 4">
             <a:extLst>
               <a:ext uri="{FF2B5EF4-FFF2-40B4-BE49-F238E27FC236}">
-                <a16:creationId xmlns:a16="http://schemas.microsoft.com/office/drawing/2014/main" id="{56BE0DBD-AC78-2C4D-BBF2-3AD6162F6229}"/>
+                <a16:creationId xmlns:a16="http://schemas.microsoft.com/office/drawing/2014/main" id="{A9B10095-B87C-AE4E-8CA1-E288C8843876}"/>
+              </a:ext>
+            </a:extLst>
+          </p:cNvPr>
+          <p:cNvPicPr/>
+          <p:nvPr/>
+        </p:nvPicPr>
+        <p:blipFill>
+          <a:blip r:embed="rId2">
+            <a:extLst>
+              <a:ext uri="{28A0092B-C50C-407E-A947-70E740481C1C}">
+                <a14:useLocalDpi xmlns:a14="http://schemas.microsoft.com/office/drawing/2010/main" val="0"/>
+              </a:ext>
+            </a:extLst>
+          </a:blip>
+          <a:stretch>
+            <a:fillRect/>
+          </a:stretch>
+        </p:blipFill>
+        <p:spPr>
+          <a:xfrm>
+            <a:off x="4278489" y="1226917"/>
+            <a:ext cx="5345672" cy="4440106"/>
+          </a:xfrm>
+          <a:prstGeom prst="rect">
+            <a:avLst/>
+          </a:prstGeom>
+        </p:spPr>
+      </p:pic>
+      <p:sp>
+        <p:nvSpPr>
+          <p:cNvPr id="4" name="ZoneTexte 3">
+            <a:extLst>
+              <a:ext uri="{FF2B5EF4-FFF2-40B4-BE49-F238E27FC236}">
+                <a16:creationId xmlns:a16="http://schemas.microsoft.com/office/drawing/2014/main" id="{95699583-B45A-254D-AF9B-41F7FCFAACB4}"/>
               </a:ext>
             </a:extLst>
           </p:cNvPr>
@@ -5694,8 +4589,8 @@
         </p:nvSpPr>
         <p:spPr>
           <a:xfrm>
-            <a:off x="349957" y="1320264"/>
-            <a:ext cx="9211732" cy="1200329"/>
+            <a:off x="445168" y="1323474"/>
+            <a:ext cx="3754299" cy="3693319"/>
           </a:xfrm>
           <a:prstGeom prst="rect">
             <a:avLst/>
@@ -5708,53 +4603,828 @@
           </a:bodyPr>
           <a:lstStyle/>
           <a:p>
-            <a:pPr marL="342900" indent="-342900">
-              <a:buFont typeface="Arial" panose="020B0604020202020204" pitchFamily="34" charset="0"/>
-              <a:buChar char="•"/>
-            </a:pPr>
-            <a:r>
-              <a:rPr lang="fr-FR" sz="2400" dirty="0">
+            <a:r>
+              <a:rPr lang="fr-FR" b="1" dirty="0">
                 <a:solidFill>
                   <a:schemeClr val="accent1"/>
                 </a:solidFill>
               </a:rPr>
-              <a:t>Une solution éprouvée, adaptable au plus près des besoins d’OC Pizza</a:t>
-            </a:r>
-          </a:p>
-          <a:p>
-            <a:pPr marL="342900" indent="-342900">
-              <a:buFont typeface="Arial" panose="020B0604020202020204" pitchFamily="34" charset="0"/>
-              <a:buChar char="•"/>
-            </a:pPr>
-            <a:r>
-              <a:rPr lang="fr-FR" sz="2400" dirty="0">
+              <a:t>Hébergement type Cloud :</a:t>
+            </a:r>
+          </a:p>
+          <a:p>
+            <a:r>
+              <a:rPr lang="fr-FR" dirty="0">
                 <a:solidFill>
                   <a:schemeClr val="accent1"/>
                 </a:solidFill>
               </a:rPr>
-              <a:t>Un mode d’hébergement économique, résilient et sécurisé</a:t>
-            </a:r>
-          </a:p>
-          <a:p>
-            <a:pPr marL="342900" indent="-342900">
-              <a:buFont typeface="Arial" panose="020B0604020202020204" pitchFamily="34" charset="0"/>
-              <a:buChar char="•"/>
-            </a:pPr>
-            <a:r>
-              <a:rPr lang="fr-FR" sz="2400" dirty="0">
+              <a:t> + économique que le VPS ou serveur privé</a:t>
+            </a:r>
+          </a:p>
+          <a:p>
+            <a:r>
+              <a:rPr lang="fr-FR" dirty="0">
                 <a:solidFill>
                   <a:schemeClr val="accent1"/>
                 </a:solidFill>
               </a:rPr>
-              <a:t>Un coût et des délais maîtrisés</a:t>
-            </a:r>
+              <a:t>+ efficace que le serveur mutualisé</a:t>
+            </a:r>
+          </a:p>
+          <a:p>
+            <a:r>
+              <a:rPr lang="fr-FR" dirty="0">
+                <a:solidFill>
+                  <a:schemeClr val="accent1"/>
+                </a:solidFill>
+              </a:rPr>
+              <a:t>- coûteux que le serveur dédié</a:t>
+            </a:r>
+          </a:p>
+          <a:p>
+            <a:endParaRPr lang="fr-FR" dirty="0">
+              <a:solidFill>
+                <a:schemeClr val="accent1"/>
+              </a:solidFill>
+            </a:endParaRPr>
+          </a:p>
+          <a:p>
+            <a:r>
+              <a:rPr lang="fr-FR" b="1" dirty="0">
+                <a:solidFill>
+                  <a:schemeClr val="accent1"/>
+                </a:solidFill>
+              </a:rPr>
+              <a:t>Pourquoi le mode Saas ?</a:t>
+            </a:r>
+          </a:p>
+          <a:p>
+            <a:r>
+              <a:rPr lang="fr-FR" dirty="0">
+                <a:solidFill>
+                  <a:schemeClr val="accent1"/>
+                </a:solidFill>
+              </a:rPr>
+              <a:t>Maintenance opérée par IT C&amp;D</a:t>
+            </a:r>
+          </a:p>
+          <a:p>
+            <a:r>
+              <a:rPr lang="fr-FR" dirty="0">
+                <a:solidFill>
+                  <a:schemeClr val="accent1"/>
+                </a:solidFill>
+              </a:rPr>
+              <a:t>Forte résilience et disponibilité</a:t>
+            </a:r>
+          </a:p>
+          <a:p>
+            <a:r>
+              <a:rPr lang="fr-FR" dirty="0">
+                <a:solidFill>
+                  <a:schemeClr val="accent1"/>
+                </a:solidFill>
+              </a:rPr>
+              <a:t>Forte sécurité des données</a:t>
+            </a:r>
+          </a:p>
+          <a:p>
+            <a:r>
+              <a:rPr lang="fr-FR" dirty="0">
+                <a:solidFill>
+                  <a:schemeClr val="accent1"/>
+                </a:solidFill>
+              </a:rPr>
+              <a:t>Accompagne croissance OC Pizza</a:t>
+            </a:r>
+          </a:p>
+          <a:p>
+            <a:r>
+              <a:rPr lang="fr-FR" dirty="0">
+                <a:solidFill>
+                  <a:schemeClr val="accent1"/>
+                </a:solidFill>
+              </a:rPr>
+              <a:t>Pas d’investissement en matériel</a:t>
+            </a:r>
+          </a:p>
+          <a:p>
+            <a:endParaRPr lang="fr-FR" dirty="0">
+              <a:solidFill>
+                <a:schemeClr val="accent1"/>
+              </a:solidFill>
+            </a:endParaRPr>
+          </a:p>
+        </p:txBody>
+      </p:sp>
+      <p:sp>
+        <p:nvSpPr>
+          <p:cNvPr id="6" name="ZoneTexte 5">
+            <a:extLst>
+              <a:ext uri="{FF2B5EF4-FFF2-40B4-BE49-F238E27FC236}">
+                <a16:creationId xmlns:a16="http://schemas.microsoft.com/office/drawing/2014/main" id="{C67DE86E-F30E-A44C-B671-E81BABEFB561}"/>
+              </a:ext>
+            </a:extLst>
+          </p:cNvPr>
+          <p:cNvSpPr txBox="1"/>
+          <p:nvPr/>
+        </p:nvSpPr>
+        <p:spPr>
+          <a:xfrm>
+            <a:off x="548839" y="5169796"/>
+            <a:ext cx="8912503" cy="1200329"/>
+          </a:xfrm>
+          <a:prstGeom prst="rect">
+            <a:avLst/>
+          </a:prstGeom>
+          <a:noFill/>
+        </p:spPr>
+        <p:txBody>
+          <a:bodyPr wrap="square" rtlCol="0">
+            <a:spAutoFit/>
+          </a:bodyPr>
+          <a:lstStyle/>
+          <a:p>
+            <a:r>
+              <a:rPr lang="fr-FR" b="1" dirty="0"/>
+              <a:t>Sources : </a:t>
+            </a:r>
+          </a:p>
+          <a:p>
+            <a:r>
+              <a:rPr lang="fr-FR" dirty="0"/>
+              <a:t>Comparatif des hébergements: </a:t>
+            </a:r>
+            <a:r>
+              <a:rPr lang="fr-FR" dirty="0">
+                <a:hlinkClick r:id="rId3"/>
+              </a:rPr>
+              <a:t>Web and Co</a:t>
+            </a:r>
+            <a:r>
+              <a:rPr lang="fr-FR" dirty="0"/>
+              <a:t> ; </a:t>
+            </a:r>
+            <a:r>
+              <a:rPr lang="fr-FR" dirty="0">
+                <a:hlinkClick r:id="rId4"/>
+              </a:rPr>
+              <a:t>Blue Host</a:t>
+            </a:r>
+            <a:endParaRPr lang="fr-FR" dirty="0"/>
+          </a:p>
+          <a:p>
+            <a:r>
+              <a:rPr lang="fr-FR" dirty="0"/>
+              <a:t>Avantages et Inconvénients </a:t>
+            </a:r>
+            <a:r>
+              <a:rPr lang="fr-FR" dirty="0" err="1"/>
+              <a:t>SaaS</a:t>
+            </a:r>
+            <a:r>
+              <a:rPr lang="fr-FR" dirty="0"/>
+              <a:t>: </a:t>
+            </a:r>
+            <a:r>
+              <a:rPr lang="fr-FR" dirty="0">
+                <a:hlinkClick r:id="rId5"/>
+              </a:rPr>
+              <a:t>Le coin des Entrepreneurs</a:t>
+            </a:r>
+            <a:r>
+              <a:rPr lang="fr-FR" dirty="0"/>
+              <a:t> ; </a:t>
+            </a:r>
+            <a:r>
+              <a:rPr lang="fr-FR" dirty="0" err="1">
+                <a:hlinkClick r:id="rId6"/>
+              </a:rPr>
+              <a:t>LeBigData.fr</a:t>
+            </a:r>
+            <a:endParaRPr lang="fr-FR" dirty="0"/>
+          </a:p>
+          <a:p>
+            <a:endParaRPr lang="fr-FR" dirty="0"/>
           </a:p>
         </p:txBody>
       </p:sp>
     </p:spTree>
     <p:extLst>
       <p:ext uri="{BB962C8B-B14F-4D97-AF65-F5344CB8AC3E}">
-        <p14:creationId xmlns:p14="http://schemas.microsoft.com/office/powerpoint/2010/main" val="4204981414"/>
+        <p14:creationId xmlns:p14="http://schemas.microsoft.com/office/powerpoint/2010/main" val="1064710970"/>
+      </p:ext>
+    </p:extLst>
+  </p:cSld>
+  <p:clrMapOvr>
+    <a:masterClrMapping/>
+  </p:clrMapOvr>
+</p:sld>
+</file>
+
+<file path=ppt/slides/slide7.xml><?xml version="1.0" encoding="utf-8"?>
+<p:sld xmlns:a="http://schemas.openxmlformats.org/drawingml/2006/main" xmlns:r="http://schemas.openxmlformats.org/officeDocument/2006/relationships" xmlns:p="http://schemas.openxmlformats.org/presentationml/2006/main">
+  <p:cSld>
+    <p:spTree>
+      <p:nvGrpSpPr>
+        <p:cNvPr id="1" name=""/>
+        <p:cNvGrpSpPr/>
+        <p:nvPr/>
+      </p:nvGrpSpPr>
+      <p:grpSpPr>
+        <a:xfrm>
+          <a:off x="0" y="0"/>
+          <a:ext cx="0" cy="0"/>
+          <a:chOff x="0" y="0"/>
+          <a:chExt cx="0" cy="0"/>
+        </a:xfrm>
+      </p:grpSpPr>
+      <p:sp>
+        <p:nvSpPr>
+          <p:cNvPr id="2" name="Titre 1">
+            <a:extLst>
+              <a:ext uri="{FF2B5EF4-FFF2-40B4-BE49-F238E27FC236}">
+                <a16:creationId xmlns:a16="http://schemas.microsoft.com/office/drawing/2014/main" id="{B2D19B05-4231-4C43-B278-CF39F13CFD3C}"/>
+              </a:ext>
+            </a:extLst>
+          </p:cNvPr>
+          <p:cNvSpPr>
+            <a:spLocks noGrp="1"/>
+          </p:cNvSpPr>
+          <p:nvPr>
+            <p:ph type="ctrTitle"/>
+          </p:nvPr>
+        </p:nvSpPr>
+        <p:spPr>
+          <a:xfrm>
+            <a:off x="548839" y="631490"/>
+            <a:ext cx="8808322" cy="595426"/>
+          </a:xfrm>
+        </p:spPr>
+        <p:txBody>
+          <a:bodyPr anchor="t">
+            <a:normAutofit/>
+          </a:bodyPr>
+          <a:lstStyle/>
+          <a:p>
+            <a:pPr algn="l"/>
+            <a:r>
+              <a:rPr lang="fr-FR" sz="2800" b="1" dirty="0">
+                <a:solidFill>
+                  <a:schemeClr val="accent1"/>
+                </a:solidFill>
+                <a:latin typeface="Apple Braille" pitchFamily="2" charset="0"/>
+              </a:rPr>
+              <a:t>3. Choix technique : customisation</a:t>
+            </a:r>
+            <a:endParaRPr lang="fr-FR" sz="2400" dirty="0"/>
+          </a:p>
+        </p:txBody>
+      </p:sp>
+      <p:sp>
+        <p:nvSpPr>
+          <p:cNvPr id="3" name="Espace réservé du pied de page 2">
+            <a:extLst>
+              <a:ext uri="{FF2B5EF4-FFF2-40B4-BE49-F238E27FC236}">
+                <a16:creationId xmlns:a16="http://schemas.microsoft.com/office/drawing/2014/main" id="{05D91EF7-03BC-704B-A9DD-31465C65BF78}"/>
+              </a:ext>
+            </a:extLst>
+          </p:cNvPr>
+          <p:cNvSpPr>
+            <a:spLocks noGrp="1"/>
+          </p:cNvSpPr>
+          <p:nvPr>
+            <p:ph type="ftr" sz="quarter" idx="11"/>
+          </p:nvPr>
+        </p:nvSpPr>
+        <p:spPr/>
+        <p:txBody>
+          <a:bodyPr/>
+          <a:lstStyle/>
+          <a:p>
+            <a:r>
+              <a:rPr lang="fr-FR" dirty="0"/>
+              <a:t>IT C&amp;D</a:t>
+            </a:r>
+          </a:p>
+        </p:txBody>
+      </p:sp>
+      <p:pic>
+        <p:nvPicPr>
+          <p:cNvPr id="9" name="Image 8">
+            <a:extLst>
+              <a:ext uri="{FF2B5EF4-FFF2-40B4-BE49-F238E27FC236}">
+                <a16:creationId xmlns:a16="http://schemas.microsoft.com/office/drawing/2014/main" id="{D32E605E-109B-BA44-A16B-422DF8BDDAE7}"/>
+              </a:ext>
+            </a:extLst>
+          </p:cNvPr>
+          <p:cNvPicPr>
+            <a:picLocks noChangeAspect="1"/>
+          </p:cNvPicPr>
+          <p:nvPr/>
+        </p:nvPicPr>
+        <p:blipFill>
+          <a:blip r:embed="rId2"/>
+          <a:stretch>
+            <a:fillRect/>
+          </a:stretch>
+        </p:blipFill>
+        <p:spPr>
+          <a:xfrm>
+            <a:off x="445168" y="1108811"/>
+            <a:ext cx="2228850" cy="778377"/>
+          </a:xfrm>
+          <a:prstGeom prst="rect">
+            <a:avLst/>
+          </a:prstGeom>
+        </p:spPr>
+      </p:pic>
+      <p:sp>
+        <p:nvSpPr>
+          <p:cNvPr id="5" name="ZoneTexte 4">
+            <a:extLst>
+              <a:ext uri="{FF2B5EF4-FFF2-40B4-BE49-F238E27FC236}">
+                <a16:creationId xmlns:a16="http://schemas.microsoft.com/office/drawing/2014/main" id="{ED8F9A6A-F0BD-5B44-89DB-ECD3534E3EEB}"/>
+              </a:ext>
+            </a:extLst>
+          </p:cNvPr>
+          <p:cNvSpPr txBox="1"/>
+          <p:nvPr/>
+        </p:nvSpPr>
+        <p:spPr>
+          <a:xfrm>
+            <a:off x="4455408" y="5987020"/>
+            <a:ext cx="5873926" cy="369332"/>
+          </a:xfrm>
+          <a:prstGeom prst="rect">
+            <a:avLst/>
+          </a:prstGeom>
+          <a:noFill/>
+        </p:spPr>
+        <p:txBody>
+          <a:bodyPr wrap="square" rtlCol="0">
+            <a:spAutoFit/>
+          </a:bodyPr>
+          <a:lstStyle/>
+          <a:p>
+            <a:r>
+              <a:rPr lang="fr-FR" dirty="0"/>
+              <a:t>Sources : </a:t>
+            </a:r>
+            <a:r>
+              <a:rPr lang="fr-FR" dirty="0">
+                <a:hlinkClick r:id="rId3"/>
+              </a:rPr>
+              <a:t>site web Odoo</a:t>
+            </a:r>
+            <a:r>
+              <a:rPr lang="fr-FR" dirty="0"/>
+              <a:t> ; </a:t>
+            </a:r>
+            <a:r>
+              <a:rPr lang="fr-FR" dirty="0">
+                <a:hlinkClick r:id="rId4"/>
+              </a:rPr>
+              <a:t>Interview du CEO d’</a:t>
+            </a:r>
+            <a:r>
+              <a:rPr lang="fr-FR" dirty="0" err="1">
+                <a:hlinkClick r:id="rId4"/>
+              </a:rPr>
+              <a:t>Odoo</a:t>
+            </a:r>
+            <a:endParaRPr lang="fr-FR" dirty="0"/>
+          </a:p>
+        </p:txBody>
+      </p:sp>
+      <p:pic>
+        <p:nvPicPr>
+          <p:cNvPr id="6" name="Image 5">
+            <a:extLst>
+              <a:ext uri="{FF2B5EF4-FFF2-40B4-BE49-F238E27FC236}">
+                <a16:creationId xmlns:a16="http://schemas.microsoft.com/office/drawing/2014/main" id="{37A205C2-896C-FD4C-A308-7B16C2709B05}"/>
+              </a:ext>
+            </a:extLst>
+          </p:cNvPr>
+          <p:cNvPicPr>
+            <a:picLocks noChangeAspect="1"/>
+          </p:cNvPicPr>
+          <p:nvPr/>
+        </p:nvPicPr>
+        <p:blipFill>
+          <a:blip r:embed="rId5"/>
+          <a:stretch>
+            <a:fillRect/>
+          </a:stretch>
+        </p:blipFill>
+        <p:spPr>
+          <a:xfrm>
+            <a:off x="7369845" y="2772437"/>
+            <a:ext cx="1389096" cy="1240495"/>
+          </a:xfrm>
+          <a:prstGeom prst="rect">
+            <a:avLst/>
+          </a:prstGeom>
+        </p:spPr>
+      </p:pic>
+      <p:pic>
+        <p:nvPicPr>
+          <p:cNvPr id="7" name="Image 6">
+            <a:extLst>
+              <a:ext uri="{FF2B5EF4-FFF2-40B4-BE49-F238E27FC236}">
+                <a16:creationId xmlns:a16="http://schemas.microsoft.com/office/drawing/2014/main" id="{E76051F4-4B81-1544-8A2C-C2D5714E5EAB}"/>
+              </a:ext>
+            </a:extLst>
+          </p:cNvPr>
+          <p:cNvPicPr>
+            <a:picLocks noChangeAspect="1"/>
+          </p:cNvPicPr>
+          <p:nvPr/>
+        </p:nvPicPr>
+        <p:blipFill>
+          <a:blip r:embed="rId6"/>
+          <a:stretch>
+            <a:fillRect/>
+          </a:stretch>
+        </p:blipFill>
+        <p:spPr>
+          <a:xfrm>
+            <a:off x="3865141" y="2808752"/>
+            <a:ext cx="1389096" cy="1240495"/>
+          </a:xfrm>
+          <a:prstGeom prst="rect">
+            <a:avLst/>
+          </a:prstGeom>
+        </p:spPr>
+      </p:pic>
+      <p:pic>
+        <p:nvPicPr>
+          <p:cNvPr id="8" name="Image 7">
+            <a:extLst>
+              <a:ext uri="{FF2B5EF4-FFF2-40B4-BE49-F238E27FC236}">
+                <a16:creationId xmlns:a16="http://schemas.microsoft.com/office/drawing/2014/main" id="{905C2DFC-ACB8-B043-8AA5-B60ADBE35E24}"/>
+              </a:ext>
+            </a:extLst>
+          </p:cNvPr>
+          <p:cNvPicPr>
+            <a:picLocks noChangeAspect="1"/>
+          </p:cNvPicPr>
+          <p:nvPr/>
+        </p:nvPicPr>
+        <p:blipFill>
+          <a:blip r:embed="rId7"/>
+          <a:stretch>
+            <a:fillRect/>
+          </a:stretch>
+        </p:blipFill>
+        <p:spPr>
+          <a:xfrm>
+            <a:off x="7369845" y="1383590"/>
+            <a:ext cx="1389096" cy="1240495"/>
+          </a:xfrm>
+          <a:prstGeom prst="rect">
+            <a:avLst/>
+          </a:prstGeom>
+        </p:spPr>
+      </p:pic>
+      <p:pic>
+        <p:nvPicPr>
+          <p:cNvPr id="10" name="Image 9">
+            <a:extLst>
+              <a:ext uri="{FF2B5EF4-FFF2-40B4-BE49-F238E27FC236}">
+                <a16:creationId xmlns:a16="http://schemas.microsoft.com/office/drawing/2014/main" id="{484B2137-608D-FB4C-8ABB-84657C7D6B02}"/>
+              </a:ext>
+            </a:extLst>
+          </p:cNvPr>
+          <p:cNvPicPr>
+            <a:picLocks noChangeAspect="1"/>
+          </p:cNvPicPr>
+          <p:nvPr/>
+        </p:nvPicPr>
+        <p:blipFill>
+          <a:blip r:embed="rId8"/>
+          <a:stretch>
+            <a:fillRect/>
+          </a:stretch>
+        </p:blipFill>
+        <p:spPr>
+          <a:xfrm>
+            <a:off x="5617493" y="2793126"/>
+            <a:ext cx="1389096" cy="1240495"/>
+          </a:xfrm>
+          <a:prstGeom prst="rect">
+            <a:avLst/>
+          </a:prstGeom>
+        </p:spPr>
+      </p:pic>
+      <p:pic>
+        <p:nvPicPr>
+          <p:cNvPr id="11" name="Image 10">
+            <a:extLst>
+              <a:ext uri="{FF2B5EF4-FFF2-40B4-BE49-F238E27FC236}">
+                <a16:creationId xmlns:a16="http://schemas.microsoft.com/office/drawing/2014/main" id="{82B75289-0F73-6E4F-8241-A54AD222A42A}"/>
+              </a:ext>
+            </a:extLst>
+          </p:cNvPr>
+          <p:cNvPicPr>
+            <a:picLocks noChangeAspect="1"/>
+          </p:cNvPicPr>
+          <p:nvPr/>
+        </p:nvPicPr>
+        <p:blipFill>
+          <a:blip r:embed="rId9"/>
+          <a:stretch>
+            <a:fillRect/>
+          </a:stretch>
+        </p:blipFill>
+        <p:spPr>
+          <a:xfrm>
+            <a:off x="2923258" y="4304786"/>
+            <a:ext cx="1365250" cy="1244600"/>
+          </a:xfrm>
+          <a:prstGeom prst="rect">
+            <a:avLst/>
+          </a:prstGeom>
+        </p:spPr>
+      </p:pic>
+      <p:pic>
+        <p:nvPicPr>
+          <p:cNvPr id="12" name="Image 11">
+            <a:extLst>
+              <a:ext uri="{FF2B5EF4-FFF2-40B4-BE49-F238E27FC236}">
+                <a16:creationId xmlns:a16="http://schemas.microsoft.com/office/drawing/2014/main" id="{87EB1381-0045-FA4F-9D2B-90DEBEC4091D}"/>
+              </a:ext>
+            </a:extLst>
+          </p:cNvPr>
+          <p:cNvPicPr>
+            <a:picLocks noChangeAspect="1"/>
+          </p:cNvPicPr>
+          <p:nvPr/>
+        </p:nvPicPr>
+        <p:blipFill>
+          <a:blip r:embed="rId10"/>
+          <a:stretch>
+            <a:fillRect/>
+          </a:stretch>
+        </p:blipFill>
+        <p:spPr>
+          <a:xfrm>
+            <a:off x="3865141" y="1379485"/>
+            <a:ext cx="1365250" cy="1244600"/>
+          </a:xfrm>
+          <a:prstGeom prst="rect">
+            <a:avLst/>
+          </a:prstGeom>
+        </p:spPr>
+      </p:pic>
+      <p:sp>
+        <p:nvSpPr>
+          <p:cNvPr id="13" name="ZoneTexte 12">
+            <a:extLst>
+              <a:ext uri="{FF2B5EF4-FFF2-40B4-BE49-F238E27FC236}">
+                <a16:creationId xmlns:a16="http://schemas.microsoft.com/office/drawing/2014/main" id="{4FD7283B-D920-6845-87FC-1842732B17C7}"/>
+              </a:ext>
+            </a:extLst>
+          </p:cNvPr>
+          <p:cNvSpPr txBox="1"/>
+          <p:nvPr/>
+        </p:nvSpPr>
+        <p:spPr>
+          <a:xfrm>
+            <a:off x="7369845" y="4272634"/>
+            <a:ext cx="1365250" cy="1200329"/>
+          </a:xfrm>
+          <a:prstGeom prst="rect">
+            <a:avLst/>
+          </a:prstGeom>
+          <a:solidFill>
+            <a:schemeClr val="accent1"/>
+          </a:solidFill>
+          <a:ln>
+            <a:solidFill>
+              <a:schemeClr val="tx1"/>
+            </a:solidFill>
+          </a:ln>
+        </p:spPr>
+        <p:txBody>
+          <a:bodyPr wrap="square" rtlCol="0">
+            <a:spAutoFit/>
+          </a:bodyPr>
+          <a:lstStyle/>
+          <a:p>
+            <a:pPr algn="ctr"/>
+            <a:r>
+              <a:rPr lang="fr-FR" b="1" dirty="0">
+                <a:solidFill>
+                  <a:schemeClr val="bg1"/>
+                </a:solidFill>
+              </a:rPr>
+              <a:t>+ Modules</a:t>
+            </a:r>
+          </a:p>
+          <a:p>
+            <a:pPr algn="ctr"/>
+            <a:r>
+              <a:rPr lang="fr-FR" b="1" dirty="0">
+                <a:solidFill>
+                  <a:schemeClr val="bg1"/>
+                </a:solidFill>
+              </a:rPr>
+              <a:t>IT C&amp;D </a:t>
+            </a:r>
+          </a:p>
+          <a:p>
+            <a:pPr algn="ctr"/>
+            <a:r>
+              <a:rPr lang="fr-FR" b="1" dirty="0">
+                <a:solidFill>
+                  <a:schemeClr val="bg1"/>
+                </a:solidFill>
+              </a:rPr>
+              <a:t>pour</a:t>
+            </a:r>
+          </a:p>
+          <a:p>
+            <a:pPr algn="ctr"/>
+            <a:r>
+              <a:rPr lang="fr-FR" b="1" dirty="0">
+                <a:solidFill>
+                  <a:schemeClr val="bg1"/>
+                </a:solidFill>
+              </a:rPr>
+              <a:t>OC Pizza</a:t>
+            </a:r>
+          </a:p>
+        </p:txBody>
+      </p:sp>
+      <p:pic>
+        <p:nvPicPr>
+          <p:cNvPr id="14" name="Image 13">
+            <a:extLst>
+              <a:ext uri="{FF2B5EF4-FFF2-40B4-BE49-F238E27FC236}">
+                <a16:creationId xmlns:a16="http://schemas.microsoft.com/office/drawing/2014/main" id="{87F311DA-16F8-D140-BDFF-F1EDEECD9127}"/>
+              </a:ext>
+            </a:extLst>
+          </p:cNvPr>
+          <p:cNvPicPr>
+            <a:picLocks noChangeAspect="1"/>
+          </p:cNvPicPr>
+          <p:nvPr/>
+        </p:nvPicPr>
+        <p:blipFill>
+          <a:blip r:embed="rId11"/>
+          <a:stretch>
+            <a:fillRect/>
+          </a:stretch>
+        </p:blipFill>
+        <p:spPr>
+          <a:xfrm>
+            <a:off x="5617493" y="1379485"/>
+            <a:ext cx="1365250" cy="1244600"/>
+          </a:xfrm>
+          <a:prstGeom prst="rect">
+            <a:avLst/>
+          </a:prstGeom>
+        </p:spPr>
+      </p:pic>
+      <p:sp>
+        <p:nvSpPr>
+          <p:cNvPr id="4" name="ZoneTexte 3">
+            <a:extLst>
+              <a:ext uri="{FF2B5EF4-FFF2-40B4-BE49-F238E27FC236}">
+                <a16:creationId xmlns:a16="http://schemas.microsoft.com/office/drawing/2014/main" id="{CC1AA28F-8125-2F47-A6D3-86B6A8BD51C2}"/>
+              </a:ext>
+            </a:extLst>
+          </p:cNvPr>
+          <p:cNvSpPr txBox="1"/>
+          <p:nvPr/>
+        </p:nvSpPr>
+        <p:spPr>
+          <a:xfrm>
+            <a:off x="1319969" y="2215040"/>
+            <a:ext cx="2432373" cy="830997"/>
+          </a:xfrm>
+          <a:prstGeom prst="rect">
+            <a:avLst/>
+          </a:prstGeom>
+          <a:noFill/>
+        </p:spPr>
+        <p:txBody>
+          <a:bodyPr wrap="square" rtlCol="0">
+            <a:spAutoFit/>
+          </a:bodyPr>
+          <a:lstStyle/>
+          <a:p>
+            <a:r>
+              <a:rPr lang="fr-FR" sz="1600" dirty="0">
+                <a:solidFill>
+                  <a:schemeClr val="accent1"/>
+                </a:solidFill>
+              </a:rPr>
+              <a:t>Des modules conçus pour être intégrés ensemble et prêts à l’usage</a:t>
+            </a:r>
+          </a:p>
+        </p:txBody>
+      </p:sp>
+      <p:sp>
+        <p:nvSpPr>
+          <p:cNvPr id="15" name="ZoneTexte 14">
+            <a:extLst>
+              <a:ext uri="{FF2B5EF4-FFF2-40B4-BE49-F238E27FC236}">
+                <a16:creationId xmlns:a16="http://schemas.microsoft.com/office/drawing/2014/main" id="{7A1D9EF9-3993-464A-9C55-49C323C2C5FC}"/>
+              </a:ext>
+            </a:extLst>
+          </p:cNvPr>
+          <p:cNvSpPr txBox="1"/>
+          <p:nvPr/>
+        </p:nvSpPr>
+        <p:spPr>
+          <a:xfrm>
+            <a:off x="445168" y="4304786"/>
+            <a:ext cx="2432373" cy="1323439"/>
+          </a:xfrm>
+          <a:prstGeom prst="rect">
+            <a:avLst/>
+          </a:prstGeom>
+          <a:noFill/>
+        </p:spPr>
+        <p:txBody>
+          <a:bodyPr wrap="square" rtlCol="0">
+            <a:spAutoFit/>
+          </a:bodyPr>
+          <a:lstStyle/>
+          <a:p>
+            <a:r>
+              <a:rPr lang="fr-FR" sz="1600" dirty="0">
+                <a:solidFill>
+                  <a:schemeClr val="accent1"/>
+                </a:solidFill>
+              </a:rPr>
+              <a:t>Avec </a:t>
+            </a:r>
+            <a:r>
+              <a:rPr lang="fr-FR" sz="1600" dirty="0" err="1">
+                <a:solidFill>
+                  <a:schemeClr val="accent1"/>
+                </a:solidFill>
+              </a:rPr>
+              <a:t>Odoo.sh</a:t>
+            </a:r>
+            <a:r>
+              <a:rPr lang="fr-FR" sz="1600" dirty="0">
+                <a:solidFill>
+                  <a:schemeClr val="accent1"/>
+                </a:solidFill>
+              </a:rPr>
+              <a:t> un hébergement sûr et adapté aux évolutions du système de gestion d’OC Pizza</a:t>
+            </a:r>
+          </a:p>
+        </p:txBody>
+      </p:sp>
+      <p:sp>
+        <p:nvSpPr>
+          <p:cNvPr id="16" name="ZoneTexte 15">
+            <a:extLst>
+              <a:ext uri="{FF2B5EF4-FFF2-40B4-BE49-F238E27FC236}">
+                <a16:creationId xmlns:a16="http://schemas.microsoft.com/office/drawing/2014/main" id="{F1B9C3C4-DC59-294B-A278-C45759C2CBDD}"/>
+              </a:ext>
+            </a:extLst>
+          </p:cNvPr>
+          <p:cNvSpPr txBox="1"/>
+          <p:nvPr/>
+        </p:nvSpPr>
+        <p:spPr>
+          <a:xfrm>
+            <a:off x="4937472" y="4281289"/>
+            <a:ext cx="2432373" cy="1077218"/>
+          </a:xfrm>
+          <a:prstGeom prst="rect">
+            <a:avLst/>
+          </a:prstGeom>
+          <a:noFill/>
+        </p:spPr>
+        <p:txBody>
+          <a:bodyPr wrap="square" rtlCol="0">
+            <a:spAutoFit/>
+          </a:bodyPr>
+          <a:lstStyle/>
+          <a:p>
+            <a:r>
+              <a:rPr lang="fr-FR" sz="1600" dirty="0">
+                <a:solidFill>
+                  <a:schemeClr val="accent1"/>
+                </a:solidFill>
+              </a:rPr>
+              <a:t>Une personnalisation poussée des modules + création de modules spécifiques pour OC Pizza</a:t>
+            </a:r>
+          </a:p>
+        </p:txBody>
+      </p:sp>
+    </p:spTree>
+    <p:extLst>
+      <p:ext uri="{BB962C8B-B14F-4D97-AF65-F5344CB8AC3E}">
+        <p14:creationId xmlns:p14="http://schemas.microsoft.com/office/powerpoint/2010/main" val="2479870680"/>
       </p:ext>
     </p:extLst>
   </p:cSld>

</xml_diff>

<commit_message>
Deliverables for the project presentation
</commit_message>
<xml_diff>
--- a/Presentation_Projet_6.pptx
+++ b/Presentation_Projet_6.pptx
@@ -5,16 +5,18 @@
     <p:sldMasterId id="2147483660" r:id="rId1"/>
   </p:sldMasterIdLst>
   <p:notesMasterIdLst>
-    <p:notesMasterId r:id="rId9"/>
+    <p:notesMasterId r:id="rId11"/>
   </p:notesMasterIdLst>
   <p:sldIdLst>
     <p:sldId id="257" r:id="rId2"/>
     <p:sldId id="258" r:id="rId3"/>
-    <p:sldId id="272" r:id="rId4"/>
-    <p:sldId id="274" r:id="rId5"/>
-    <p:sldId id="273" r:id="rId6"/>
-    <p:sldId id="271" r:id="rId7"/>
-    <p:sldId id="266" r:id="rId8"/>
+    <p:sldId id="277" r:id="rId4"/>
+    <p:sldId id="272" r:id="rId5"/>
+    <p:sldId id="274" r:id="rId6"/>
+    <p:sldId id="278" r:id="rId7"/>
+    <p:sldId id="273" r:id="rId8"/>
+    <p:sldId id="275" r:id="rId9"/>
+    <p:sldId id="276" r:id="rId10"/>
   </p:sldIdLst>
   <p:sldSz cx="9906000" cy="6858000" type="A4"/>
   <p:notesSz cx="6858000" cy="9144000"/>
@@ -203,7 +205,7 @@
           <a:p>
             <a:fld id="{4B69CDCA-E64B-A943-B702-DD7733AB0C8D}" type="datetimeFigureOut">
               <a:rPr lang="fr-FR" smtClean="0"/>
-              <a:t>07/04/2020</a:t>
+              <a:t>19/06/2020</a:t>
             </a:fld>
             <a:endParaRPr lang="fr-FR"/>
           </a:p>
@@ -656,7 +658,7 @@
             <a:fld id="{0C031793-CBA2-6848-B1BF-8F14D50C12D4}" type="datetime1">
               <a:rPr lang="fr-FR" smtClean="0"/>
               <a:pPr/>
-              <a:t>07/04/2020</a:t>
+              <a:t>19/06/2020</a:t>
             </a:fld>
             <a:endParaRPr lang="fr-FR" dirty="0"/>
           </a:p>
@@ -975,7 +977,7 @@
           <a:p>
             <a:fld id="{595D9934-1740-4448-857C-B5461CE44AF9}" type="datetime1">
               <a:rPr lang="fr-FR" smtClean="0"/>
-              <a:t>07/04/2020</a:t>
+              <a:t>19/06/2020</a:t>
             </a:fld>
             <a:endParaRPr lang="fr-FR"/>
           </a:p>
@@ -1158,7 +1160,7 @@
           <a:p>
             <a:fld id="{62B0FA18-4789-6245-9F99-73C898928011}" type="datetime1">
               <a:rPr lang="fr-FR" smtClean="0"/>
-              <a:t>07/04/2020</a:t>
+              <a:t>19/06/2020</a:t>
             </a:fld>
             <a:endParaRPr lang="fr-FR"/>
           </a:p>
@@ -1331,7 +1333,7 @@
           <a:p>
             <a:fld id="{DC1AF0C8-2255-D045-AFB8-C8BB8EF94D16}" type="datetime1">
               <a:rPr lang="fr-FR" smtClean="0"/>
-              <a:t>07/04/2020</a:t>
+              <a:t>19/06/2020</a:t>
             </a:fld>
             <a:endParaRPr lang="fr-FR"/>
           </a:p>
@@ -1578,7 +1580,7 @@
           <a:p>
             <a:fld id="{F82E36F3-83CE-7245-A3C4-9DB8E0D02540}" type="datetime1">
               <a:rPr lang="fr-FR" smtClean="0"/>
-              <a:t>07/04/2020</a:t>
+              <a:t>19/06/2020</a:t>
             </a:fld>
             <a:endParaRPr lang="fr-FR"/>
           </a:p>
@@ -1813,7 +1815,7 @@
           <a:p>
             <a:fld id="{223C6EE7-0E00-9048-ACBE-9C4FBD2AEF7C}" type="datetime1">
               <a:rPr lang="fr-FR" smtClean="0"/>
-              <a:t>07/04/2020</a:t>
+              <a:t>19/06/2020</a:t>
             </a:fld>
             <a:endParaRPr lang="fr-FR"/>
           </a:p>
@@ -2183,7 +2185,7 @@
           <a:p>
             <a:fld id="{9E86E127-E23D-E74C-8F56-46A0AB6FD150}" type="datetime1">
               <a:rPr lang="fr-FR" smtClean="0"/>
-              <a:t>07/04/2020</a:t>
+              <a:t>19/06/2020</a:t>
             </a:fld>
             <a:endParaRPr lang="fr-FR"/>
           </a:p>
@@ -2304,7 +2306,7 @@
           <a:p>
             <a:fld id="{2004C70A-11C1-0C4F-9D8F-8FD8F59824E8}" type="datetime1">
               <a:rPr lang="fr-FR" smtClean="0"/>
-              <a:t>07/04/2020</a:t>
+              <a:t>19/06/2020</a:t>
             </a:fld>
             <a:endParaRPr lang="fr-FR"/>
           </a:p>
@@ -2402,7 +2404,7 @@
           <a:p>
             <a:fld id="{B08FB7C3-47F6-7746-B42A-4F89B6F64CA4}" type="datetime1">
               <a:rPr lang="fr-FR" smtClean="0"/>
-              <a:t>07/04/2020</a:t>
+              <a:t>19/06/2020</a:t>
             </a:fld>
             <a:endParaRPr lang="fr-FR"/>
           </a:p>
@@ -2682,7 +2684,7 @@
           <a:p>
             <a:fld id="{AF0B3876-A6B1-CA4E-B887-E7AF3605B51E}" type="datetime1">
               <a:rPr lang="fr-FR" smtClean="0"/>
-              <a:t>07/04/2020</a:t>
+              <a:t>19/06/2020</a:t>
             </a:fld>
             <a:endParaRPr lang="fr-FR"/>
           </a:p>
@@ -2942,7 +2944,7 @@
           <a:p>
             <a:fld id="{50B35551-8540-9641-A215-130D7495E71C}" type="datetime1">
               <a:rPr lang="fr-FR" smtClean="0"/>
-              <a:t>07/04/2020</a:t>
+              <a:t>19/06/2020</a:t>
             </a:fld>
             <a:endParaRPr lang="fr-FR"/>
           </a:p>
@@ -3158,7 +3160,7 @@
           <a:p>
             <a:fld id="{728E0450-E201-B242-B6E1-F87817FD333F}" type="datetime1">
               <a:rPr lang="fr-FR" smtClean="0"/>
-              <a:t>07/04/2020</a:t>
+              <a:t>19/06/2020</a:t>
             </a:fld>
             <a:endParaRPr lang="fr-FR"/>
           </a:p>
@@ -3612,16 +3614,8 @@
               <a:rPr lang="fr-FR" sz="2800" b="1" dirty="0"/>
             </a:br>
             <a:r>
-              <a:rPr lang="fr-FR" sz="3200" b="1" dirty="0" err="1"/>
-              <a:t>Technical</a:t>
-            </a:r>
-            <a:r>
               <a:rPr lang="fr-FR" sz="3200" b="1" dirty="0"/>
-              <a:t> </a:t>
-            </a:r>
-            <a:r>
-              <a:rPr lang="fr-FR" sz="3200" b="1" dirty="0" err="1"/>
-              <a:t>Specifications</a:t>
+              <a:t>Spécifications techniques</a:t>
             </a:r>
             <a:br>
               <a:rPr lang="fr-FR" sz="3200" b="1" dirty="0"/>
@@ -3798,7 +3792,7 @@
                 </a:solidFill>
                 <a:latin typeface="Apple Braille" pitchFamily="2" charset="0"/>
               </a:rPr>
-              <a:t>Slides</a:t>
+              <a:t>Note Liminaire</a:t>
             </a:r>
             <a:endParaRPr lang="fr-FR" sz="2400" dirty="0"/>
           </a:p>
@@ -3846,8 +3840,8 @@
         </p:nvSpPr>
         <p:spPr>
           <a:xfrm>
-            <a:off x="1642100" y="1613118"/>
-            <a:ext cx="6412375" cy="2677656"/>
+            <a:off x="719192" y="1613118"/>
+            <a:ext cx="7941924" cy="3108543"/>
           </a:xfrm>
           <a:prstGeom prst="rect">
             <a:avLst/>
@@ -3860,16 +3854,21 @@
           </a:bodyPr>
           <a:lstStyle/>
           <a:p>
-            <a:pPr marL="342900" indent="-342900">
-              <a:buAutoNum type="arabicPeriod"/>
-            </a:pPr>
+            <a:r>
+              <a:rPr lang="fr-FR" sz="2800" dirty="0">
+                <a:solidFill>
+                  <a:schemeClr val="accent1"/>
+                </a:solidFill>
+              </a:rPr>
+              <a:t>L’ensemble des diagrammes est accessible sur </a:t>
+            </a:r>
             <a:r>
               <a:rPr lang="fr-FR" sz="2800" dirty="0" err="1">
                 <a:solidFill>
                   <a:schemeClr val="accent1"/>
                 </a:solidFill>
               </a:rPr>
-              <a:t>Context</a:t>
+              <a:t>LucidChart</a:t>
             </a:r>
             <a:r>
               <a:rPr lang="fr-FR" sz="2800" dirty="0">
@@ -3877,15 +3876,16 @@
                   <a:schemeClr val="accent1"/>
                 </a:solidFill>
               </a:rPr>
-              <a:t> </a:t>
-            </a:r>
-            <a:r>
-              <a:rPr lang="fr-FR" sz="2800" dirty="0" err="1">
+              <a:t> avec le lien suivant : </a:t>
+            </a:r>
+            <a:r>
+              <a:rPr lang="fr-FR" sz="2800" dirty="0">
                 <a:solidFill>
                   <a:schemeClr val="accent1"/>
                 </a:solidFill>
+                <a:hlinkClick r:id="rId2"/>
               </a:rPr>
-              <a:t>Diagram</a:t>
+              <a:t>LIEN</a:t>
             </a:r>
             <a:endParaRPr lang="fr-FR" sz="2800" dirty="0">
               <a:solidFill>
@@ -3894,24 +3894,29 @@
             </a:endParaRPr>
           </a:p>
           <a:p>
-            <a:pPr marL="342900" indent="-342900">
-              <a:buAutoNum type="arabicPeriod"/>
-            </a:pPr>
+            <a:endParaRPr lang="fr-FR" sz="2800" dirty="0">
+              <a:solidFill>
+                <a:schemeClr val="accent1"/>
+              </a:solidFill>
+            </a:endParaRPr>
+          </a:p>
+          <a:p>
             <a:r>
               <a:rPr lang="fr-FR" sz="2800" dirty="0">
                 <a:solidFill>
                   <a:schemeClr val="accent1"/>
                 </a:solidFill>
               </a:rPr>
-              <a:t>Package </a:t>
-            </a:r>
-            <a:r>
-              <a:rPr lang="fr-FR" sz="2800" dirty="0" err="1">
+              <a:t>Les dumps de la base de données  sont accessibles sur GitHub : </a:t>
+            </a:r>
+            <a:r>
+              <a:rPr lang="fr-FR" sz="2800" dirty="0">
                 <a:solidFill>
                   <a:schemeClr val="accent1"/>
                 </a:solidFill>
+                <a:hlinkClick r:id="rId3"/>
               </a:rPr>
-              <a:t>Diagram</a:t>
+              <a:t>LIEN</a:t>
             </a:r>
             <a:endParaRPr lang="fr-FR" sz="2800" dirty="0">
               <a:solidFill>
@@ -3920,95 +3925,21 @@
             </a:endParaRPr>
           </a:p>
           <a:p>
-            <a:pPr marL="342900" indent="-342900">
-              <a:buAutoNum type="arabicPeriod"/>
-            </a:pPr>
-            <a:r>
-              <a:rPr lang="fr-FR" sz="2800" dirty="0" err="1">
-                <a:solidFill>
-                  <a:schemeClr val="accent1"/>
-                </a:solidFill>
-              </a:rPr>
-              <a:t>Order</a:t>
-            </a:r>
+            <a:endParaRPr lang="fr-FR" sz="2800" dirty="0">
+              <a:solidFill>
+                <a:schemeClr val="accent1"/>
+              </a:solidFill>
+            </a:endParaRPr>
+          </a:p>
+          <a:p>
             <a:r>
               <a:rPr lang="fr-FR" sz="2800" dirty="0">
                 <a:solidFill>
                   <a:schemeClr val="accent1"/>
                 </a:solidFill>
               </a:rPr>
-              <a:t> </a:t>
-            </a:r>
-            <a:r>
-              <a:rPr lang="fr-FR" sz="2800" dirty="0" err="1">
-                <a:solidFill>
-                  <a:schemeClr val="accent1"/>
-                </a:solidFill>
-              </a:rPr>
-              <a:t>Process</a:t>
-            </a:r>
-            <a:endParaRPr lang="fr-FR" sz="2800" dirty="0">
-              <a:solidFill>
-                <a:schemeClr val="accent1"/>
-              </a:solidFill>
-            </a:endParaRPr>
-          </a:p>
-          <a:p>
-            <a:pPr marL="342900" indent="-342900">
-              <a:buAutoNum type="arabicPeriod"/>
-            </a:pPr>
-            <a:r>
-              <a:rPr lang="fr-FR" sz="2800" dirty="0">
-                <a:solidFill>
-                  <a:schemeClr val="accent1"/>
-                </a:solidFill>
-              </a:rPr>
-              <a:t>System </a:t>
-            </a:r>
-            <a:r>
-              <a:rPr lang="fr-FR" sz="2800" dirty="0" err="1">
-                <a:solidFill>
-                  <a:schemeClr val="accent1"/>
-                </a:solidFill>
-              </a:rPr>
-              <a:t>Deployment</a:t>
-            </a:r>
-            <a:endParaRPr lang="fr-FR" sz="2800" dirty="0">
-              <a:solidFill>
-                <a:schemeClr val="accent1"/>
-              </a:solidFill>
-            </a:endParaRPr>
-          </a:p>
-          <a:p>
-            <a:pPr marL="342900" indent="-342900">
-              <a:buAutoNum type="arabicPeriod"/>
-            </a:pPr>
-            <a:r>
-              <a:rPr lang="fr-FR" sz="2800" dirty="0" err="1">
-                <a:solidFill>
-                  <a:schemeClr val="accent1"/>
-                </a:solidFill>
-              </a:rPr>
-              <a:t>Technical</a:t>
-            </a:r>
-            <a:r>
-              <a:rPr lang="fr-FR" sz="2800" dirty="0">
-                <a:solidFill>
-                  <a:schemeClr val="accent1"/>
-                </a:solidFill>
-              </a:rPr>
-              <a:t> solution</a:t>
-            </a:r>
-          </a:p>
-          <a:p>
-            <a:pPr marL="342900" indent="-342900">
-              <a:buAutoNum type="arabicPeriod"/>
-            </a:pPr>
-            <a:endParaRPr lang="fr-FR" sz="2800" dirty="0">
-              <a:solidFill>
-                <a:schemeClr val="accent1"/>
-              </a:solidFill>
-            </a:endParaRPr>
+              <a:t>Un compte rendu du projet est joint à ce dossier.</a:t>
+            </a:r>
           </a:p>
         </p:txBody>
       </p:sp>
@@ -4072,13 +4003,13 @@
           <a:p>
             <a:pPr algn="l"/>
             <a:r>
-              <a:rPr lang="fr-FR" sz="2800" b="1">
+              <a:rPr lang="fr-FR" sz="2800" b="1" dirty="0">
                 <a:solidFill>
                   <a:schemeClr val="accent1"/>
                 </a:solidFill>
                 <a:latin typeface="Apple Braille" pitchFamily="2" charset="0"/>
               </a:rPr>
-              <a:t>Context Diagram</a:t>
+              <a:t>Liste des diagrammes disponibles</a:t>
             </a:r>
             <a:endParaRPr lang="fr-FR" sz="2400" dirty="0"/>
           </a:p>
@@ -4106,47 +4037,110 @@
           <a:lstStyle/>
           <a:p>
             <a:r>
-              <a:rPr lang="fr-FR"/>
+              <a:rPr lang="fr-FR" dirty="0"/>
               <a:t>IT C&amp;D</a:t>
             </a:r>
-            <a:endParaRPr lang="fr-FR" dirty="0"/>
-          </a:p>
-        </p:txBody>
-      </p:sp>
-      <p:pic>
-        <p:nvPicPr>
-          <p:cNvPr id="6" name="Image 5">
+          </a:p>
+        </p:txBody>
+      </p:sp>
+      <p:sp>
+        <p:nvSpPr>
+          <p:cNvPr id="4" name="ZoneTexte 3">
             <a:extLst>
               <a:ext uri="{FF2B5EF4-FFF2-40B4-BE49-F238E27FC236}">
-                <a16:creationId xmlns:a16="http://schemas.microsoft.com/office/drawing/2014/main" id="{0C0FEB95-BE40-0F48-A25A-07AF08F73B29}"/>
+                <a16:creationId xmlns:a16="http://schemas.microsoft.com/office/drawing/2014/main" id="{E3B4F61E-C420-BF49-A015-3AE7ACC57B87}"/>
               </a:ext>
             </a:extLst>
           </p:cNvPr>
-          <p:cNvPicPr>
-            <a:picLocks noChangeAspect="1"/>
-          </p:cNvPicPr>
+          <p:cNvSpPr txBox="1"/>
           <p:nvPr/>
-        </p:nvPicPr>
-        <p:blipFill>
-          <a:blip r:embed="rId2"/>
-          <a:stretch>
-            <a:fillRect/>
-          </a:stretch>
-        </p:blipFill>
+        </p:nvSpPr>
         <p:spPr>
           <a:xfrm>
-            <a:off x="1346200" y="1226916"/>
-            <a:ext cx="7213600" cy="4775200"/>
+            <a:off x="719192" y="1613118"/>
+            <a:ext cx="7941924" cy="2246769"/>
           </a:xfrm>
           <a:prstGeom prst="rect">
             <a:avLst/>
           </a:prstGeom>
+          <a:noFill/>
         </p:spPr>
-      </p:pic>
+        <p:txBody>
+          <a:bodyPr wrap="square" rtlCol="0">
+            <a:spAutoFit/>
+          </a:bodyPr>
+          <a:lstStyle/>
+          <a:p>
+            <a:pPr marL="342900" indent="-342900">
+              <a:buAutoNum type="arabicPeriod"/>
+            </a:pPr>
+            <a:r>
+              <a:rPr lang="fr-FR" sz="2800" dirty="0">
+                <a:solidFill>
+                  <a:schemeClr val="accent1"/>
+                </a:solidFill>
+              </a:rPr>
+              <a:t>Diagramme de packages</a:t>
+            </a:r>
+          </a:p>
+          <a:p>
+            <a:pPr marL="342900" indent="-342900">
+              <a:buAutoNum type="arabicPeriod"/>
+            </a:pPr>
+            <a:r>
+              <a:rPr lang="fr-FR" sz="2800" dirty="0">
+                <a:solidFill>
+                  <a:schemeClr val="accent1"/>
+                </a:solidFill>
+              </a:rPr>
+              <a:t>Diagramme de classes</a:t>
+            </a:r>
+          </a:p>
+          <a:p>
+            <a:pPr marL="342900" indent="-342900">
+              <a:buAutoNum type="arabicPeriod"/>
+            </a:pPr>
+            <a:r>
+              <a:rPr lang="fr-FR" sz="2800" dirty="0">
+                <a:solidFill>
+                  <a:schemeClr val="accent1"/>
+                </a:solidFill>
+              </a:rPr>
+              <a:t>Diagramme des relations entre entités (ERD)</a:t>
+            </a:r>
+          </a:p>
+          <a:p>
+            <a:pPr marL="342900" indent="-342900">
+              <a:buAutoNum type="arabicPeriod"/>
+            </a:pPr>
+            <a:r>
+              <a:rPr lang="fr-FR" sz="2800" dirty="0">
+                <a:solidFill>
+                  <a:schemeClr val="accent1"/>
+                </a:solidFill>
+              </a:rPr>
+              <a:t>Diagramme des composants</a:t>
+            </a:r>
+          </a:p>
+          <a:p>
+            <a:pPr marL="342900" indent="-342900">
+              <a:buAutoNum type="arabicPeriod"/>
+            </a:pPr>
+            <a:r>
+              <a:rPr lang="fr-FR" sz="2800" dirty="0">
+                <a:solidFill>
+                  <a:schemeClr val="accent1"/>
+                </a:solidFill>
+              </a:rPr>
+              <a:t>Diagramme de déploiement</a:t>
+            </a:r>
+          </a:p>
+        </p:txBody>
+      </p:sp>
     </p:spTree>
     <p:extLst>
       <p:ext uri="{BB962C8B-B14F-4D97-AF65-F5344CB8AC3E}">
-        <p14:creationId xmlns:p14="http://schemas.microsoft.com/office/powerpoint/2010/main" val="1992179877"/>
+        <p14:creationId xmlns:p14="http://schemas.microsoft.com/office/powerpoint/2010/main" val="1991720929"/>
       </p:ext>
     </p:extLst>
   </p:cSld>
@@ -4209,16 +4203,7 @@
                 </a:solidFill>
                 <a:latin typeface="Apple Braille" pitchFamily="2" charset="0"/>
               </a:rPr>
-              <a:t>Package </a:t>
-            </a:r>
-            <a:r>
-              <a:rPr lang="fr-FR" sz="2800" b="1" dirty="0" err="1">
-                <a:solidFill>
-                  <a:schemeClr val="accent1"/>
-                </a:solidFill>
-                <a:latin typeface="Apple Braille" pitchFamily="2" charset="0"/>
-              </a:rPr>
-              <a:t>Diagram</a:t>
+              <a:t>Diagramme de Packages</a:t>
             </a:r>
             <a:endParaRPr lang="fr-FR" sz="2400" dirty="0"/>
           </a:p>
@@ -4258,7 +4243,7 @@
           <p:cNvPr id="5" name="Image 4">
             <a:extLst>
               <a:ext uri="{FF2B5EF4-FFF2-40B4-BE49-F238E27FC236}">
-                <a16:creationId xmlns:a16="http://schemas.microsoft.com/office/drawing/2014/main" id="{37294FA2-13FA-FA4E-AB08-A9338CB13614}"/>
+                <a16:creationId xmlns:a16="http://schemas.microsoft.com/office/drawing/2014/main" id="{CCB097B3-FB1D-F84A-90EF-B50927834021}"/>
               </a:ext>
             </a:extLst>
           </p:cNvPr>
@@ -4275,8 +4260,8 @@
         </p:blipFill>
         <p:spPr>
           <a:xfrm>
-            <a:off x="0" y="1608505"/>
-            <a:ext cx="9906000" cy="3640989"/>
+            <a:off x="2121408" y="1165140"/>
+            <a:ext cx="6946392" cy="5113317"/>
           </a:xfrm>
           <a:prstGeom prst="rect">
             <a:avLst/>
@@ -4286,7 +4271,7 @@
     </p:spTree>
     <p:extLst>
       <p:ext uri="{BB962C8B-B14F-4D97-AF65-F5344CB8AC3E}">
-        <p14:creationId xmlns:p14="http://schemas.microsoft.com/office/powerpoint/2010/main" val="2493743640"/>
+        <p14:creationId xmlns:p14="http://schemas.microsoft.com/office/powerpoint/2010/main" val="1992179877"/>
       </p:ext>
     </p:extLst>
   </p:cSld>
@@ -4343,31 +4328,13 @@
           <a:p>
             <a:pPr algn="l"/>
             <a:r>
-              <a:rPr lang="fr-FR" sz="2800" b="1" dirty="0" err="1">
-                <a:solidFill>
-                  <a:schemeClr val="accent1"/>
-                </a:solidFill>
-                <a:latin typeface="Apple Braille" pitchFamily="2" charset="0"/>
-              </a:rPr>
-              <a:t>Order</a:t>
-            </a:r>
-            <a:r>
               <a:rPr lang="fr-FR" sz="2800" b="1" dirty="0">
                 <a:solidFill>
                   <a:schemeClr val="accent1"/>
                 </a:solidFill>
                 <a:latin typeface="Apple Braille" pitchFamily="2" charset="0"/>
               </a:rPr>
-              <a:t> </a:t>
-            </a:r>
-            <a:r>
-              <a:rPr lang="fr-FR" sz="2800" b="1" dirty="0" err="1">
-                <a:solidFill>
-                  <a:schemeClr val="accent1"/>
-                </a:solidFill>
-                <a:latin typeface="Apple Braille" pitchFamily="2" charset="0"/>
-              </a:rPr>
-              <a:t>Process</a:t>
+              <a:t>Diagramme de Classes (Sales)</a:t>
             </a:r>
             <a:endParaRPr lang="fr-FR" sz="2400" dirty="0"/>
           </a:p>
@@ -4407,7 +4374,7 @@
           <p:cNvPr id="5" name="Image 4">
             <a:extLst>
               <a:ext uri="{FF2B5EF4-FFF2-40B4-BE49-F238E27FC236}">
-                <a16:creationId xmlns:a16="http://schemas.microsoft.com/office/drawing/2014/main" id="{F97A350A-80E5-0847-9C0C-1CE04062123E}"/>
+                <a16:creationId xmlns:a16="http://schemas.microsoft.com/office/drawing/2014/main" id="{C9A4D3B4-C629-CB40-BF07-F8627E842A44}"/>
               </a:ext>
             </a:extLst>
           </p:cNvPr>
@@ -4424,8 +4391,8 @@
         </p:blipFill>
         <p:spPr>
           <a:xfrm>
-            <a:off x="3856161" y="312516"/>
-            <a:ext cx="4298485" cy="5631084"/>
+            <a:off x="1036320" y="1326827"/>
+            <a:ext cx="7833360" cy="4929614"/>
           </a:xfrm>
           <a:prstGeom prst="rect">
             <a:avLst/>
@@ -4435,7 +4402,7 @@
     </p:spTree>
     <p:extLst>
       <p:ext uri="{BB962C8B-B14F-4D97-AF65-F5344CB8AC3E}">
-        <p14:creationId xmlns:p14="http://schemas.microsoft.com/office/powerpoint/2010/main" val="3475876367"/>
+        <p14:creationId xmlns:p14="http://schemas.microsoft.com/office/powerpoint/2010/main" val="2493743640"/>
       </p:ext>
     </p:extLst>
   </p:cSld>
@@ -4498,16 +4465,16 @@
                 </a:solidFill>
                 <a:latin typeface="Apple Braille" pitchFamily="2" charset="0"/>
               </a:rPr>
-              <a:t>3. Choix technique: Simplicité du mode </a:t>
-            </a:r>
-            <a:r>
-              <a:rPr lang="fr-FR" sz="2800" b="1" dirty="0" err="1">
+              <a:t>Diagramme de Classes (Point Of </a:t>
+            </a:r>
+            <a:r>
+              <a:rPr lang="fr-FR" sz="2800" b="1">
                 <a:solidFill>
                   <a:schemeClr val="accent1"/>
                 </a:solidFill>
                 <a:latin typeface="Apple Braille" pitchFamily="2" charset="0"/>
               </a:rPr>
-              <a:t>SaaS</a:t>
+              <a:t>Sales Operations)</a:t>
             </a:r>
             <a:endParaRPr lang="fr-FR" sz="2400" dirty="0"/>
           </a:p>
@@ -4535,9 +4502,10 @@
           <a:lstStyle/>
           <a:p>
             <a:r>
-              <a:rPr lang="fr-FR" dirty="0"/>
+              <a:rPr lang="fr-FR"/>
               <a:t>IT C&amp;D</a:t>
             </a:r>
+            <a:endParaRPr lang="fr-FR" dirty="0"/>
           </a:p>
         </p:txBody>
       </p:sp>
@@ -4546,274 +4514,35 @@
           <p:cNvPr id="5" name="Image 4">
             <a:extLst>
               <a:ext uri="{FF2B5EF4-FFF2-40B4-BE49-F238E27FC236}">
-                <a16:creationId xmlns:a16="http://schemas.microsoft.com/office/drawing/2014/main" id="{A9B10095-B87C-AE4E-8CA1-E288C8843876}"/>
+                <a16:creationId xmlns:a16="http://schemas.microsoft.com/office/drawing/2014/main" id="{490C7BFE-82CF-1F4F-851A-D01E21E77630}"/>
               </a:ext>
             </a:extLst>
           </p:cNvPr>
-          <p:cNvPicPr/>
+          <p:cNvPicPr>
+            <a:picLocks noChangeAspect="1"/>
+          </p:cNvPicPr>
           <p:nvPr/>
         </p:nvPicPr>
         <p:blipFill>
-          <a:blip r:embed="rId2">
-            <a:extLst>
-              <a:ext uri="{28A0092B-C50C-407E-A947-70E740481C1C}">
-                <a14:useLocalDpi xmlns:a14="http://schemas.microsoft.com/office/drawing/2010/main" val="0"/>
-              </a:ext>
-            </a:extLst>
-          </a:blip>
+          <a:blip r:embed="rId2"/>
           <a:stretch>
             <a:fillRect/>
           </a:stretch>
         </p:blipFill>
         <p:spPr>
           <a:xfrm>
-            <a:off x="4278489" y="1226917"/>
-            <a:ext cx="5345672" cy="4440106"/>
+            <a:off x="0" y="1150055"/>
+            <a:ext cx="9906000" cy="4557889"/>
           </a:xfrm>
           <a:prstGeom prst="rect">
             <a:avLst/>
           </a:prstGeom>
         </p:spPr>
       </p:pic>
-      <p:sp>
-        <p:nvSpPr>
-          <p:cNvPr id="4" name="ZoneTexte 3">
-            <a:extLst>
-              <a:ext uri="{FF2B5EF4-FFF2-40B4-BE49-F238E27FC236}">
-                <a16:creationId xmlns:a16="http://schemas.microsoft.com/office/drawing/2014/main" id="{95699583-B45A-254D-AF9B-41F7FCFAACB4}"/>
-              </a:ext>
-            </a:extLst>
-          </p:cNvPr>
-          <p:cNvSpPr txBox="1"/>
-          <p:nvPr/>
-        </p:nvSpPr>
-        <p:spPr>
-          <a:xfrm>
-            <a:off x="445168" y="1323474"/>
-            <a:ext cx="3754299" cy="3693319"/>
-          </a:xfrm>
-          <a:prstGeom prst="rect">
-            <a:avLst/>
-          </a:prstGeom>
-          <a:noFill/>
-        </p:spPr>
-        <p:txBody>
-          <a:bodyPr wrap="square" rtlCol="0">
-            <a:spAutoFit/>
-          </a:bodyPr>
-          <a:lstStyle/>
-          <a:p>
-            <a:r>
-              <a:rPr lang="fr-FR" b="1" dirty="0">
-                <a:solidFill>
-                  <a:schemeClr val="accent1"/>
-                </a:solidFill>
-              </a:rPr>
-              <a:t>Hébergement type Cloud :</a:t>
-            </a:r>
-          </a:p>
-          <a:p>
-            <a:r>
-              <a:rPr lang="fr-FR" dirty="0">
-                <a:solidFill>
-                  <a:schemeClr val="accent1"/>
-                </a:solidFill>
-              </a:rPr>
-              <a:t> + économique que le VPS ou serveur privé</a:t>
-            </a:r>
-          </a:p>
-          <a:p>
-            <a:r>
-              <a:rPr lang="fr-FR" dirty="0">
-                <a:solidFill>
-                  <a:schemeClr val="accent1"/>
-                </a:solidFill>
-              </a:rPr>
-              <a:t>+ efficace que le serveur mutualisé</a:t>
-            </a:r>
-          </a:p>
-          <a:p>
-            <a:r>
-              <a:rPr lang="fr-FR" dirty="0">
-                <a:solidFill>
-                  <a:schemeClr val="accent1"/>
-                </a:solidFill>
-              </a:rPr>
-              <a:t>- coûteux que le serveur dédié</a:t>
-            </a:r>
-          </a:p>
-          <a:p>
-            <a:endParaRPr lang="fr-FR" dirty="0">
-              <a:solidFill>
-                <a:schemeClr val="accent1"/>
-              </a:solidFill>
-            </a:endParaRPr>
-          </a:p>
-          <a:p>
-            <a:r>
-              <a:rPr lang="fr-FR" b="1" dirty="0">
-                <a:solidFill>
-                  <a:schemeClr val="accent1"/>
-                </a:solidFill>
-              </a:rPr>
-              <a:t>Pourquoi le mode Saas ?</a:t>
-            </a:r>
-          </a:p>
-          <a:p>
-            <a:r>
-              <a:rPr lang="fr-FR" dirty="0">
-                <a:solidFill>
-                  <a:schemeClr val="accent1"/>
-                </a:solidFill>
-              </a:rPr>
-              <a:t>Maintenance opérée par IT C&amp;D</a:t>
-            </a:r>
-          </a:p>
-          <a:p>
-            <a:r>
-              <a:rPr lang="fr-FR" dirty="0">
-                <a:solidFill>
-                  <a:schemeClr val="accent1"/>
-                </a:solidFill>
-              </a:rPr>
-              <a:t>Forte résilience et disponibilité</a:t>
-            </a:r>
-          </a:p>
-          <a:p>
-            <a:r>
-              <a:rPr lang="fr-FR" dirty="0">
-                <a:solidFill>
-                  <a:schemeClr val="accent1"/>
-                </a:solidFill>
-              </a:rPr>
-              <a:t>Forte sécurité des données</a:t>
-            </a:r>
-          </a:p>
-          <a:p>
-            <a:r>
-              <a:rPr lang="fr-FR" dirty="0">
-                <a:solidFill>
-                  <a:schemeClr val="accent1"/>
-                </a:solidFill>
-              </a:rPr>
-              <a:t>Accompagne croissance OC Pizza</a:t>
-            </a:r>
-          </a:p>
-          <a:p>
-            <a:r>
-              <a:rPr lang="fr-FR" dirty="0">
-                <a:solidFill>
-                  <a:schemeClr val="accent1"/>
-                </a:solidFill>
-              </a:rPr>
-              <a:t>Pas d’investissement en matériel</a:t>
-            </a:r>
-          </a:p>
-          <a:p>
-            <a:endParaRPr lang="fr-FR" dirty="0">
-              <a:solidFill>
-                <a:schemeClr val="accent1"/>
-              </a:solidFill>
-            </a:endParaRPr>
-          </a:p>
-        </p:txBody>
-      </p:sp>
-      <p:sp>
-        <p:nvSpPr>
-          <p:cNvPr id="6" name="ZoneTexte 5">
-            <a:extLst>
-              <a:ext uri="{FF2B5EF4-FFF2-40B4-BE49-F238E27FC236}">
-                <a16:creationId xmlns:a16="http://schemas.microsoft.com/office/drawing/2014/main" id="{C67DE86E-F30E-A44C-B671-E81BABEFB561}"/>
-              </a:ext>
-            </a:extLst>
-          </p:cNvPr>
-          <p:cNvSpPr txBox="1"/>
-          <p:nvPr/>
-        </p:nvSpPr>
-        <p:spPr>
-          <a:xfrm>
-            <a:off x="548839" y="5169796"/>
-            <a:ext cx="8912503" cy="1200329"/>
-          </a:xfrm>
-          <a:prstGeom prst="rect">
-            <a:avLst/>
-          </a:prstGeom>
-          <a:noFill/>
-        </p:spPr>
-        <p:txBody>
-          <a:bodyPr wrap="square" rtlCol="0">
-            <a:spAutoFit/>
-          </a:bodyPr>
-          <a:lstStyle/>
-          <a:p>
-            <a:r>
-              <a:rPr lang="fr-FR" b="1" dirty="0"/>
-              <a:t>Sources : </a:t>
-            </a:r>
-          </a:p>
-          <a:p>
-            <a:r>
-              <a:rPr lang="fr-FR" dirty="0"/>
-              <a:t>Comparatif des hébergements: </a:t>
-            </a:r>
-            <a:r>
-              <a:rPr lang="fr-FR" dirty="0">
-                <a:hlinkClick r:id="rId3"/>
-              </a:rPr>
-              <a:t>Web and Co</a:t>
-            </a:r>
-            <a:r>
-              <a:rPr lang="fr-FR" dirty="0"/>
-              <a:t> ; </a:t>
-            </a:r>
-            <a:r>
-              <a:rPr lang="fr-FR" dirty="0">
-                <a:hlinkClick r:id="rId4"/>
-              </a:rPr>
-              <a:t>Blue Host</a:t>
-            </a:r>
-            <a:endParaRPr lang="fr-FR" dirty="0"/>
-          </a:p>
-          <a:p>
-            <a:r>
-              <a:rPr lang="fr-FR" dirty="0"/>
-              <a:t>Avantages et Inconvénients </a:t>
-            </a:r>
-            <a:r>
-              <a:rPr lang="fr-FR" dirty="0" err="1"/>
-              <a:t>SaaS</a:t>
-            </a:r>
-            <a:r>
-              <a:rPr lang="fr-FR" dirty="0"/>
-              <a:t>: </a:t>
-            </a:r>
-            <a:r>
-              <a:rPr lang="fr-FR" dirty="0">
-                <a:hlinkClick r:id="rId5"/>
-              </a:rPr>
-              <a:t>Le coin des Entrepreneurs</a:t>
-            </a:r>
-            <a:r>
-              <a:rPr lang="fr-FR" dirty="0"/>
-              <a:t> ; </a:t>
-            </a:r>
-            <a:r>
-              <a:rPr lang="fr-FR" dirty="0" err="1">
-                <a:hlinkClick r:id="rId6"/>
-              </a:rPr>
-              <a:t>LeBigData.fr</a:t>
-            </a:r>
-            <a:endParaRPr lang="fr-FR" dirty="0"/>
-          </a:p>
-          <a:p>
-            <a:endParaRPr lang="fr-FR" dirty="0"/>
-          </a:p>
-        </p:txBody>
-      </p:sp>
     </p:spTree>
     <p:extLst>
       <p:ext uri="{BB962C8B-B14F-4D97-AF65-F5344CB8AC3E}">
-        <p14:creationId xmlns:p14="http://schemas.microsoft.com/office/powerpoint/2010/main" val="1064710970"/>
+        <p14:creationId xmlns:p14="http://schemas.microsoft.com/office/powerpoint/2010/main" val="2401714575"/>
       </p:ext>
     </p:extLst>
   </p:cSld>
@@ -4876,7 +4605,7 @@
                 </a:solidFill>
                 <a:latin typeface="Apple Braille" pitchFamily="2" charset="0"/>
               </a:rPr>
-              <a:t>3. Choix technique : customisation</a:t>
+              <a:t>Diagramme des relations entre entités</a:t>
             </a:r>
             <a:endParaRPr lang="fr-FR" sz="2400" dirty="0"/>
           </a:p>
@@ -4904,18 +4633,19 @@
           <a:lstStyle/>
           <a:p>
             <a:r>
-              <a:rPr lang="fr-FR" dirty="0"/>
+              <a:rPr lang="fr-FR"/>
               <a:t>IT C&amp;D</a:t>
             </a:r>
+            <a:endParaRPr lang="fr-FR" dirty="0"/>
           </a:p>
         </p:txBody>
       </p:sp>
       <p:pic>
         <p:nvPicPr>
-          <p:cNvPr id="9" name="Image 8">
+          <p:cNvPr id="5" name="Image 4">
             <a:extLst>
               <a:ext uri="{FF2B5EF4-FFF2-40B4-BE49-F238E27FC236}">
-                <a16:creationId xmlns:a16="http://schemas.microsoft.com/office/drawing/2014/main" id="{D32E605E-109B-BA44-A16B-422DF8BDDAE7}"/>
+                <a16:creationId xmlns:a16="http://schemas.microsoft.com/office/drawing/2014/main" id="{1CFA2A31-14FA-FB4A-8129-FC3D33BC3194}"/>
               </a:ext>
             </a:extLst>
           </p:cNvPr>
@@ -4932,67 +4662,110 @@
         </p:blipFill>
         <p:spPr>
           <a:xfrm>
-            <a:off x="445168" y="1108811"/>
-            <a:ext cx="2228850" cy="778377"/>
+            <a:off x="1511609" y="1226916"/>
+            <a:ext cx="7845552" cy="5081207"/>
           </a:xfrm>
           <a:prstGeom prst="rect">
             <a:avLst/>
           </a:prstGeom>
         </p:spPr>
       </p:pic>
-      <p:sp>
-        <p:nvSpPr>
-          <p:cNvPr id="5" name="ZoneTexte 4">
+    </p:spTree>
+    <p:extLst>
+      <p:ext uri="{BB962C8B-B14F-4D97-AF65-F5344CB8AC3E}">
+        <p14:creationId xmlns:p14="http://schemas.microsoft.com/office/powerpoint/2010/main" val="3475876367"/>
+      </p:ext>
+    </p:extLst>
+  </p:cSld>
+  <p:clrMapOvr>
+    <a:masterClrMapping/>
+  </p:clrMapOvr>
+</p:sld>
+</file>
+
+<file path=ppt/slides/slide8.xml><?xml version="1.0" encoding="utf-8"?>
+<p:sld xmlns:a="http://schemas.openxmlformats.org/drawingml/2006/main" xmlns:r="http://schemas.openxmlformats.org/officeDocument/2006/relationships" xmlns:p="http://schemas.openxmlformats.org/presentationml/2006/main">
+  <p:cSld>
+    <p:spTree>
+      <p:nvGrpSpPr>
+        <p:cNvPr id="1" name=""/>
+        <p:cNvGrpSpPr/>
+        <p:nvPr/>
+      </p:nvGrpSpPr>
+      <p:grpSpPr>
+        <a:xfrm>
+          <a:off x="0" y="0"/>
+          <a:ext cx="0" cy="0"/>
+          <a:chOff x="0" y="0"/>
+          <a:chExt cx="0" cy="0"/>
+        </a:xfrm>
+      </p:grpSpPr>
+      <p:sp>
+        <p:nvSpPr>
+          <p:cNvPr id="2" name="Titre 1">
             <a:extLst>
               <a:ext uri="{FF2B5EF4-FFF2-40B4-BE49-F238E27FC236}">
-                <a16:creationId xmlns:a16="http://schemas.microsoft.com/office/drawing/2014/main" id="{ED8F9A6A-F0BD-5B44-89DB-ECD3534E3EEB}"/>
+                <a16:creationId xmlns:a16="http://schemas.microsoft.com/office/drawing/2014/main" id="{B2D19B05-4231-4C43-B278-CF39F13CFD3C}"/>
               </a:ext>
             </a:extLst>
           </p:cNvPr>
-          <p:cNvSpPr txBox="1"/>
-          <p:nvPr/>
+          <p:cNvSpPr>
+            <a:spLocks noGrp="1"/>
+          </p:cNvSpPr>
+          <p:nvPr>
+            <p:ph type="ctrTitle"/>
+          </p:nvPr>
         </p:nvSpPr>
         <p:spPr>
           <a:xfrm>
-            <a:off x="4455408" y="5987020"/>
-            <a:ext cx="5873926" cy="369332"/>
+            <a:off x="548839" y="631490"/>
+            <a:ext cx="8808322" cy="595426"/>
           </a:xfrm>
-          <a:prstGeom prst="rect">
-            <a:avLst/>
-          </a:prstGeom>
-          <a:noFill/>
         </p:spPr>
         <p:txBody>
-          <a:bodyPr wrap="square" rtlCol="0">
-            <a:spAutoFit/>
+          <a:bodyPr anchor="t">
+            <a:normAutofit/>
           </a:bodyPr>
           <a:lstStyle/>
           <a:p>
-            <a:r>
-              <a:rPr lang="fr-FR" dirty="0"/>
-              <a:t>Sources : </a:t>
-            </a:r>
-            <a:r>
-              <a:rPr lang="fr-FR" dirty="0">
-                <a:hlinkClick r:id="rId3"/>
+            <a:pPr algn="l"/>
+            <a:r>
+              <a:rPr lang="fr-FR" sz="2800" b="1" dirty="0">
+                <a:solidFill>
+                  <a:schemeClr val="accent1"/>
+                </a:solidFill>
+                <a:latin typeface="Apple Braille" pitchFamily="2" charset="0"/>
               </a:rPr>
-              <a:t>site web Odoo</a:t>
-            </a:r>
-            <a:r>
-              <a:rPr lang="fr-FR" dirty="0"/>
-              <a:t> ; </a:t>
-            </a:r>
-            <a:r>
-              <a:rPr lang="fr-FR" dirty="0">
-                <a:hlinkClick r:id="rId4"/>
-              </a:rPr>
-              <a:t>Interview du CEO d’</a:t>
-            </a:r>
-            <a:r>
-              <a:rPr lang="fr-FR" dirty="0" err="1">
-                <a:hlinkClick r:id="rId4"/>
-              </a:rPr>
-              <a:t>Odoo</a:t>
+              <a:t>Diagramme des Composants</a:t>
+            </a:r>
+            <a:endParaRPr lang="fr-FR" sz="2400" dirty="0"/>
+          </a:p>
+        </p:txBody>
+      </p:sp>
+      <p:sp>
+        <p:nvSpPr>
+          <p:cNvPr id="3" name="Espace réservé du pied de page 2">
+            <a:extLst>
+              <a:ext uri="{FF2B5EF4-FFF2-40B4-BE49-F238E27FC236}">
+                <a16:creationId xmlns:a16="http://schemas.microsoft.com/office/drawing/2014/main" id="{05D91EF7-03BC-704B-A9DD-31465C65BF78}"/>
+              </a:ext>
+            </a:extLst>
+          </p:cNvPr>
+          <p:cNvSpPr>
+            <a:spLocks noGrp="1"/>
+          </p:cNvSpPr>
+          <p:nvPr>
+            <p:ph type="ftr" sz="quarter" idx="11"/>
+          </p:nvPr>
+        </p:nvSpPr>
+        <p:spPr/>
+        <p:txBody>
+          <a:bodyPr/>
+          <a:lstStyle/>
+          <a:p>
+            <a:r>
+              <a:rPr lang="fr-FR"/>
+              <a:t>IT C&amp;D</a:t>
             </a:r>
             <a:endParaRPr lang="fr-FR" dirty="0"/>
           </a:p>
@@ -5000,10 +4773,10 @@
       </p:sp>
       <p:pic>
         <p:nvPicPr>
-          <p:cNvPr id="6" name="Image 5">
+          <p:cNvPr id="5" name="Image 4">
             <a:extLst>
               <a:ext uri="{FF2B5EF4-FFF2-40B4-BE49-F238E27FC236}">
-                <a16:creationId xmlns:a16="http://schemas.microsoft.com/office/drawing/2014/main" id="{37A205C2-896C-FD4C-A308-7B16C2709B05}"/>
+                <a16:creationId xmlns:a16="http://schemas.microsoft.com/office/drawing/2014/main" id="{4D42453D-6C6A-2640-95B2-7C7ECBD6ED71}"/>
               </a:ext>
             </a:extLst>
           </p:cNvPr>
@@ -5013,27 +4786,128 @@
           <p:nvPr/>
         </p:nvPicPr>
         <p:blipFill>
-          <a:blip r:embed="rId5"/>
+          <a:blip r:embed="rId2"/>
           <a:stretch>
             <a:fillRect/>
           </a:stretch>
         </p:blipFill>
         <p:spPr>
           <a:xfrm>
-            <a:off x="7369845" y="2772437"/>
-            <a:ext cx="1389096" cy="1240495"/>
+            <a:off x="1775481" y="1205804"/>
+            <a:ext cx="6355038" cy="5020706"/>
           </a:xfrm>
           <a:prstGeom prst="rect">
             <a:avLst/>
           </a:prstGeom>
         </p:spPr>
       </p:pic>
+    </p:spTree>
+    <p:extLst>
+      <p:ext uri="{BB962C8B-B14F-4D97-AF65-F5344CB8AC3E}">
+        <p14:creationId xmlns:p14="http://schemas.microsoft.com/office/powerpoint/2010/main" val="1923911685"/>
+      </p:ext>
+    </p:extLst>
+  </p:cSld>
+  <p:clrMapOvr>
+    <a:masterClrMapping/>
+  </p:clrMapOvr>
+</p:sld>
+</file>
+
+<file path=ppt/slides/slide9.xml><?xml version="1.0" encoding="utf-8"?>
+<p:sld xmlns:a="http://schemas.openxmlformats.org/drawingml/2006/main" xmlns:r="http://schemas.openxmlformats.org/officeDocument/2006/relationships" xmlns:p="http://schemas.openxmlformats.org/presentationml/2006/main">
+  <p:cSld>
+    <p:spTree>
+      <p:nvGrpSpPr>
+        <p:cNvPr id="1" name=""/>
+        <p:cNvGrpSpPr/>
+        <p:nvPr/>
+      </p:nvGrpSpPr>
+      <p:grpSpPr>
+        <a:xfrm>
+          <a:off x="0" y="0"/>
+          <a:ext cx="0" cy="0"/>
+          <a:chOff x="0" y="0"/>
+          <a:chExt cx="0" cy="0"/>
+        </a:xfrm>
+      </p:grpSpPr>
+      <p:sp>
+        <p:nvSpPr>
+          <p:cNvPr id="2" name="Titre 1">
+            <a:extLst>
+              <a:ext uri="{FF2B5EF4-FFF2-40B4-BE49-F238E27FC236}">
+                <a16:creationId xmlns:a16="http://schemas.microsoft.com/office/drawing/2014/main" id="{B2D19B05-4231-4C43-B278-CF39F13CFD3C}"/>
+              </a:ext>
+            </a:extLst>
+          </p:cNvPr>
+          <p:cNvSpPr>
+            <a:spLocks noGrp="1"/>
+          </p:cNvSpPr>
+          <p:nvPr>
+            <p:ph type="ctrTitle"/>
+          </p:nvPr>
+        </p:nvSpPr>
+        <p:spPr>
+          <a:xfrm>
+            <a:off x="548839" y="631490"/>
+            <a:ext cx="8808322" cy="595426"/>
+          </a:xfrm>
+        </p:spPr>
+        <p:txBody>
+          <a:bodyPr anchor="t">
+            <a:normAutofit/>
+          </a:bodyPr>
+          <a:lstStyle/>
+          <a:p>
+            <a:pPr algn="l"/>
+            <a:r>
+              <a:rPr lang="fr-FR" sz="2800" b="1" dirty="0">
+                <a:solidFill>
+                  <a:schemeClr val="accent1"/>
+                </a:solidFill>
+                <a:latin typeface="Apple Braille" pitchFamily="2" charset="0"/>
+              </a:rPr>
+              <a:t>Diagramme de Déploiement</a:t>
+            </a:r>
+            <a:endParaRPr lang="fr-FR" sz="2400" dirty="0"/>
+          </a:p>
+        </p:txBody>
+      </p:sp>
+      <p:sp>
+        <p:nvSpPr>
+          <p:cNvPr id="3" name="Espace réservé du pied de page 2">
+            <a:extLst>
+              <a:ext uri="{FF2B5EF4-FFF2-40B4-BE49-F238E27FC236}">
+                <a16:creationId xmlns:a16="http://schemas.microsoft.com/office/drawing/2014/main" id="{05D91EF7-03BC-704B-A9DD-31465C65BF78}"/>
+              </a:ext>
+            </a:extLst>
+          </p:cNvPr>
+          <p:cNvSpPr>
+            <a:spLocks noGrp="1"/>
+          </p:cNvSpPr>
+          <p:nvPr>
+            <p:ph type="ftr" sz="quarter" idx="11"/>
+          </p:nvPr>
+        </p:nvSpPr>
+        <p:spPr/>
+        <p:txBody>
+          <a:bodyPr/>
+          <a:lstStyle/>
+          <a:p>
+            <a:r>
+              <a:rPr lang="fr-FR"/>
+              <a:t>IT C&amp;D</a:t>
+            </a:r>
+            <a:endParaRPr lang="fr-FR" dirty="0"/>
+          </a:p>
+        </p:txBody>
+      </p:sp>
       <p:pic>
         <p:nvPicPr>
-          <p:cNvPr id="7" name="Image 6">
+          <p:cNvPr id="5" name="Image 4">
             <a:extLst>
               <a:ext uri="{FF2B5EF4-FFF2-40B4-BE49-F238E27FC236}">
-                <a16:creationId xmlns:a16="http://schemas.microsoft.com/office/drawing/2014/main" id="{E76051F4-4B81-1544-8A2C-C2D5714E5EAB}"/>
+                <a16:creationId xmlns:a16="http://schemas.microsoft.com/office/drawing/2014/main" id="{40FCADE0-2341-F349-868F-9A5C612C42EF}"/>
               </a:ext>
             </a:extLst>
           </p:cNvPr>
@@ -5043,388 +4917,25 @@
           <p:nvPr/>
         </p:nvPicPr>
         <p:blipFill>
-          <a:blip r:embed="rId6"/>
+          <a:blip r:embed="rId2"/>
           <a:stretch>
             <a:fillRect/>
           </a:stretch>
         </p:blipFill>
         <p:spPr>
           <a:xfrm>
-            <a:off x="3865141" y="2808752"/>
-            <a:ext cx="1389096" cy="1240495"/>
+            <a:off x="1497644" y="1226916"/>
+            <a:ext cx="6731956" cy="4800472"/>
           </a:xfrm>
           <a:prstGeom prst="rect">
             <a:avLst/>
           </a:prstGeom>
         </p:spPr>
       </p:pic>
-      <p:pic>
-        <p:nvPicPr>
-          <p:cNvPr id="8" name="Image 7">
-            <a:extLst>
-              <a:ext uri="{FF2B5EF4-FFF2-40B4-BE49-F238E27FC236}">
-                <a16:creationId xmlns:a16="http://schemas.microsoft.com/office/drawing/2014/main" id="{905C2DFC-ACB8-B043-8AA5-B60ADBE35E24}"/>
-              </a:ext>
-            </a:extLst>
-          </p:cNvPr>
-          <p:cNvPicPr>
-            <a:picLocks noChangeAspect="1"/>
-          </p:cNvPicPr>
-          <p:nvPr/>
-        </p:nvPicPr>
-        <p:blipFill>
-          <a:blip r:embed="rId7"/>
-          <a:stretch>
-            <a:fillRect/>
-          </a:stretch>
-        </p:blipFill>
-        <p:spPr>
-          <a:xfrm>
-            <a:off x="7369845" y="1383590"/>
-            <a:ext cx="1389096" cy="1240495"/>
-          </a:xfrm>
-          <a:prstGeom prst="rect">
-            <a:avLst/>
-          </a:prstGeom>
-        </p:spPr>
-      </p:pic>
-      <p:pic>
-        <p:nvPicPr>
-          <p:cNvPr id="10" name="Image 9">
-            <a:extLst>
-              <a:ext uri="{FF2B5EF4-FFF2-40B4-BE49-F238E27FC236}">
-                <a16:creationId xmlns:a16="http://schemas.microsoft.com/office/drawing/2014/main" id="{484B2137-608D-FB4C-8ABB-84657C7D6B02}"/>
-              </a:ext>
-            </a:extLst>
-          </p:cNvPr>
-          <p:cNvPicPr>
-            <a:picLocks noChangeAspect="1"/>
-          </p:cNvPicPr>
-          <p:nvPr/>
-        </p:nvPicPr>
-        <p:blipFill>
-          <a:blip r:embed="rId8"/>
-          <a:stretch>
-            <a:fillRect/>
-          </a:stretch>
-        </p:blipFill>
-        <p:spPr>
-          <a:xfrm>
-            <a:off x="5617493" y="2793126"/>
-            <a:ext cx="1389096" cy="1240495"/>
-          </a:xfrm>
-          <a:prstGeom prst="rect">
-            <a:avLst/>
-          </a:prstGeom>
-        </p:spPr>
-      </p:pic>
-      <p:pic>
-        <p:nvPicPr>
-          <p:cNvPr id="11" name="Image 10">
-            <a:extLst>
-              <a:ext uri="{FF2B5EF4-FFF2-40B4-BE49-F238E27FC236}">
-                <a16:creationId xmlns:a16="http://schemas.microsoft.com/office/drawing/2014/main" id="{82B75289-0F73-6E4F-8241-A54AD222A42A}"/>
-              </a:ext>
-            </a:extLst>
-          </p:cNvPr>
-          <p:cNvPicPr>
-            <a:picLocks noChangeAspect="1"/>
-          </p:cNvPicPr>
-          <p:nvPr/>
-        </p:nvPicPr>
-        <p:blipFill>
-          <a:blip r:embed="rId9"/>
-          <a:stretch>
-            <a:fillRect/>
-          </a:stretch>
-        </p:blipFill>
-        <p:spPr>
-          <a:xfrm>
-            <a:off x="2923258" y="4304786"/>
-            <a:ext cx="1365250" cy="1244600"/>
-          </a:xfrm>
-          <a:prstGeom prst="rect">
-            <a:avLst/>
-          </a:prstGeom>
-        </p:spPr>
-      </p:pic>
-      <p:pic>
-        <p:nvPicPr>
-          <p:cNvPr id="12" name="Image 11">
-            <a:extLst>
-              <a:ext uri="{FF2B5EF4-FFF2-40B4-BE49-F238E27FC236}">
-                <a16:creationId xmlns:a16="http://schemas.microsoft.com/office/drawing/2014/main" id="{87EB1381-0045-FA4F-9D2B-90DEBEC4091D}"/>
-              </a:ext>
-            </a:extLst>
-          </p:cNvPr>
-          <p:cNvPicPr>
-            <a:picLocks noChangeAspect="1"/>
-          </p:cNvPicPr>
-          <p:nvPr/>
-        </p:nvPicPr>
-        <p:blipFill>
-          <a:blip r:embed="rId10"/>
-          <a:stretch>
-            <a:fillRect/>
-          </a:stretch>
-        </p:blipFill>
-        <p:spPr>
-          <a:xfrm>
-            <a:off x="3865141" y="1379485"/>
-            <a:ext cx="1365250" cy="1244600"/>
-          </a:xfrm>
-          <a:prstGeom prst="rect">
-            <a:avLst/>
-          </a:prstGeom>
-        </p:spPr>
-      </p:pic>
-      <p:sp>
-        <p:nvSpPr>
-          <p:cNvPr id="13" name="ZoneTexte 12">
-            <a:extLst>
-              <a:ext uri="{FF2B5EF4-FFF2-40B4-BE49-F238E27FC236}">
-                <a16:creationId xmlns:a16="http://schemas.microsoft.com/office/drawing/2014/main" id="{4FD7283B-D920-6845-87FC-1842732B17C7}"/>
-              </a:ext>
-            </a:extLst>
-          </p:cNvPr>
-          <p:cNvSpPr txBox="1"/>
-          <p:nvPr/>
-        </p:nvSpPr>
-        <p:spPr>
-          <a:xfrm>
-            <a:off x="7369845" y="4272634"/>
-            <a:ext cx="1365250" cy="1200329"/>
-          </a:xfrm>
-          <a:prstGeom prst="rect">
-            <a:avLst/>
-          </a:prstGeom>
-          <a:solidFill>
-            <a:schemeClr val="accent1"/>
-          </a:solidFill>
-          <a:ln>
-            <a:solidFill>
-              <a:schemeClr val="tx1"/>
-            </a:solidFill>
-          </a:ln>
-        </p:spPr>
-        <p:txBody>
-          <a:bodyPr wrap="square" rtlCol="0">
-            <a:spAutoFit/>
-          </a:bodyPr>
-          <a:lstStyle/>
-          <a:p>
-            <a:pPr algn="ctr"/>
-            <a:r>
-              <a:rPr lang="fr-FR" b="1" dirty="0">
-                <a:solidFill>
-                  <a:schemeClr val="bg1"/>
-                </a:solidFill>
-              </a:rPr>
-              <a:t>+ Modules</a:t>
-            </a:r>
-          </a:p>
-          <a:p>
-            <a:pPr algn="ctr"/>
-            <a:r>
-              <a:rPr lang="fr-FR" b="1" dirty="0">
-                <a:solidFill>
-                  <a:schemeClr val="bg1"/>
-                </a:solidFill>
-              </a:rPr>
-              <a:t>IT C&amp;D </a:t>
-            </a:r>
-          </a:p>
-          <a:p>
-            <a:pPr algn="ctr"/>
-            <a:r>
-              <a:rPr lang="fr-FR" b="1" dirty="0">
-                <a:solidFill>
-                  <a:schemeClr val="bg1"/>
-                </a:solidFill>
-              </a:rPr>
-              <a:t>pour</a:t>
-            </a:r>
-          </a:p>
-          <a:p>
-            <a:pPr algn="ctr"/>
-            <a:r>
-              <a:rPr lang="fr-FR" b="1" dirty="0">
-                <a:solidFill>
-                  <a:schemeClr val="bg1"/>
-                </a:solidFill>
-              </a:rPr>
-              <a:t>OC Pizza</a:t>
-            </a:r>
-          </a:p>
-        </p:txBody>
-      </p:sp>
-      <p:pic>
-        <p:nvPicPr>
-          <p:cNvPr id="14" name="Image 13">
-            <a:extLst>
-              <a:ext uri="{FF2B5EF4-FFF2-40B4-BE49-F238E27FC236}">
-                <a16:creationId xmlns:a16="http://schemas.microsoft.com/office/drawing/2014/main" id="{87F311DA-16F8-D140-BDFF-F1EDEECD9127}"/>
-              </a:ext>
-            </a:extLst>
-          </p:cNvPr>
-          <p:cNvPicPr>
-            <a:picLocks noChangeAspect="1"/>
-          </p:cNvPicPr>
-          <p:nvPr/>
-        </p:nvPicPr>
-        <p:blipFill>
-          <a:blip r:embed="rId11"/>
-          <a:stretch>
-            <a:fillRect/>
-          </a:stretch>
-        </p:blipFill>
-        <p:spPr>
-          <a:xfrm>
-            <a:off x="5617493" y="1379485"/>
-            <a:ext cx="1365250" cy="1244600"/>
-          </a:xfrm>
-          <a:prstGeom prst="rect">
-            <a:avLst/>
-          </a:prstGeom>
-        </p:spPr>
-      </p:pic>
-      <p:sp>
-        <p:nvSpPr>
-          <p:cNvPr id="4" name="ZoneTexte 3">
-            <a:extLst>
-              <a:ext uri="{FF2B5EF4-FFF2-40B4-BE49-F238E27FC236}">
-                <a16:creationId xmlns:a16="http://schemas.microsoft.com/office/drawing/2014/main" id="{CC1AA28F-8125-2F47-A6D3-86B6A8BD51C2}"/>
-              </a:ext>
-            </a:extLst>
-          </p:cNvPr>
-          <p:cNvSpPr txBox="1"/>
-          <p:nvPr/>
-        </p:nvSpPr>
-        <p:spPr>
-          <a:xfrm>
-            <a:off x="1319969" y="2215040"/>
-            <a:ext cx="2432373" cy="830997"/>
-          </a:xfrm>
-          <a:prstGeom prst="rect">
-            <a:avLst/>
-          </a:prstGeom>
-          <a:noFill/>
-        </p:spPr>
-        <p:txBody>
-          <a:bodyPr wrap="square" rtlCol="0">
-            <a:spAutoFit/>
-          </a:bodyPr>
-          <a:lstStyle/>
-          <a:p>
-            <a:r>
-              <a:rPr lang="fr-FR" sz="1600" dirty="0">
-                <a:solidFill>
-                  <a:schemeClr val="accent1"/>
-                </a:solidFill>
-              </a:rPr>
-              <a:t>Des modules conçus pour être intégrés ensemble et prêts à l’usage</a:t>
-            </a:r>
-          </a:p>
-        </p:txBody>
-      </p:sp>
-      <p:sp>
-        <p:nvSpPr>
-          <p:cNvPr id="15" name="ZoneTexte 14">
-            <a:extLst>
-              <a:ext uri="{FF2B5EF4-FFF2-40B4-BE49-F238E27FC236}">
-                <a16:creationId xmlns:a16="http://schemas.microsoft.com/office/drawing/2014/main" id="{7A1D9EF9-3993-464A-9C55-49C323C2C5FC}"/>
-              </a:ext>
-            </a:extLst>
-          </p:cNvPr>
-          <p:cNvSpPr txBox="1"/>
-          <p:nvPr/>
-        </p:nvSpPr>
-        <p:spPr>
-          <a:xfrm>
-            <a:off x="445168" y="4304786"/>
-            <a:ext cx="2432373" cy="1323439"/>
-          </a:xfrm>
-          <a:prstGeom prst="rect">
-            <a:avLst/>
-          </a:prstGeom>
-          <a:noFill/>
-        </p:spPr>
-        <p:txBody>
-          <a:bodyPr wrap="square" rtlCol="0">
-            <a:spAutoFit/>
-          </a:bodyPr>
-          <a:lstStyle/>
-          <a:p>
-            <a:r>
-              <a:rPr lang="fr-FR" sz="1600" dirty="0">
-                <a:solidFill>
-                  <a:schemeClr val="accent1"/>
-                </a:solidFill>
-              </a:rPr>
-              <a:t>Avec </a:t>
-            </a:r>
-            <a:r>
-              <a:rPr lang="fr-FR" sz="1600" dirty="0" err="1">
-                <a:solidFill>
-                  <a:schemeClr val="accent1"/>
-                </a:solidFill>
-              </a:rPr>
-              <a:t>Odoo.sh</a:t>
-            </a:r>
-            <a:r>
-              <a:rPr lang="fr-FR" sz="1600" dirty="0">
-                <a:solidFill>
-                  <a:schemeClr val="accent1"/>
-                </a:solidFill>
-              </a:rPr>
-              <a:t> un hébergement sûr et adapté aux évolutions du système de gestion d’OC Pizza</a:t>
-            </a:r>
-          </a:p>
-        </p:txBody>
-      </p:sp>
-      <p:sp>
-        <p:nvSpPr>
-          <p:cNvPr id="16" name="ZoneTexte 15">
-            <a:extLst>
-              <a:ext uri="{FF2B5EF4-FFF2-40B4-BE49-F238E27FC236}">
-                <a16:creationId xmlns:a16="http://schemas.microsoft.com/office/drawing/2014/main" id="{F1B9C3C4-DC59-294B-A278-C45759C2CBDD}"/>
-              </a:ext>
-            </a:extLst>
-          </p:cNvPr>
-          <p:cNvSpPr txBox="1"/>
-          <p:nvPr/>
-        </p:nvSpPr>
-        <p:spPr>
-          <a:xfrm>
-            <a:off x="4937472" y="4281289"/>
-            <a:ext cx="2432373" cy="1077218"/>
-          </a:xfrm>
-          <a:prstGeom prst="rect">
-            <a:avLst/>
-          </a:prstGeom>
-          <a:noFill/>
-        </p:spPr>
-        <p:txBody>
-          <a:bodyPr wrap="square" rtlCol="0">
-            <a:spAutoFit/>
-          </a:bodyPr>
-          <a:lstStyle/>
-          <a:p>
-            <a:r>
-              <a:rPr lang="fr-FR" sz="1600" dirty="0">
-                <a:solidFill>
-                  <a:schemeClr val="accent1"/>
-                </a:solidFill>
-              </a:rPr>
-              <a:t>Une personnalisation poussée des modules + création de modules spécifiques pour OC Pizza</a:t>
-            </a:r>
-          </a:p>
-        </p:txBody>
-      </p:sp>
     </p:spTree>
     <p:extLst>
       <p:ext uri="{BB962C8B-B14F-4D97-AF65-F5344CB8AC3E}">
-        <p14:creationId xmlns:p14="http://schemas.microsoft.com/office/powerpoint/2010/main" val="2479870680"/>
+        <p14:creationId xmlns:p14="http://schemas.microsoft.com/office/powerpoint/2010/main" val="1287675979"/>
       </p:ext>
     </p:extLst>
   </p:cSld>

</xml_diff>